<commit_message>
Add FIM, aider and cline slides
</commit_message>
<xml_diff>
--- a/Инструменты ИИ для программирования.pptx
+++ b/Инструменты ИИ для программирования.pptx
@@ -13,19 +13,38 @@
     <p:sldId id="261" r:id="rId7"/>
     <p:sldId id="265" r:id="rId8"/>
     <p:sldId id="264" r:id="rId9"/>
-    <p:sldId id="262" r:id="rId10"/>
-    <p:sldId id="263" r:id="rId11"/>
-    <p:sldId id="266" r:id="rId12"/>
-    <p:sldId id="267" r:id="rId13"/>
-    <p:sldId id="268" r:id="rId14"/>
-    <p:sldId id="273" r:id="rId15"/>
-    <p:sldId id="269" r:id="rId16"/>
-    <p:sldId id="270" r:id="rId17"/>
-    <p:sldId id="271" r:id="rId18"/>
-    <p:sldId id="272" r:id="rId19"/>
-    <p:sldId id="275" r:id="rId20"/>
-    <p:sldId id="274" r:id="rId21"/>
-    <p:sldId id="276" r:id="rId22"/>
+    <p:sldId id="277" r:id="rId10"/>
+    <p:sldId id="262" r:id="rId11"/>
+    <p:sldId id="263" r:id="rId12"/>
+    <p:sldId id="266" r:id="rId13"/>
+    <p:sldId id="267" r:id="rId14"/>
+    <p:sldId id="268" r:id="rId15"/>
+    <p:sldId id="273" r:id="rId16"/>
+    <p:sldId id="269" r:id="rId17"/>
+    <p:sldId id="270" r:id="rId18"/>
+    <p:sldId id="271" r:id="rId19"/>
+    <p:sldId id="272" r:id="rId20"/>
+    <p:sldId id="275" r:id="rId21"/>
+    <p:sldId id="274" r:id="rId22"/>
+    <p:sldId id="283" r:id="rId23"/>
+    <p:sldId id="282" r:id="rId24"/>
+    <p:sldId id="278" r:id="rId25"/>
+    <p:sldId id="281" r:id="rId26"/>
+    <p:sldId id="280" r:id="rId27"/>
+    <p:sldId id="284" r:id="rId28"/>
+    <p:sldId id="285" r:id="rId29"/>
+    <p:sldId id="286" r:id="rId30"/>
+    <p:sldId id="287" r:id="rId31"/>
+    <p:sldId id="288" r:id="rId32"/>
+    <p:sldId id="289" r:id="rId33"/>
+    <p:sldId id="291" r:id="rId34"/>
+    <p:sldId id="290" r:id="rId35"/>
+    <p:sldId id="292" r:id="rId36"/>
+    <p:sldId id="295" r:id="rId37"/>
+    <p:sldId id="293" r:id="rId38"/>
+    <p:sldId id="294" r:id="rId39"/>
+    <p:sldId id="296" r:id="rId40"/>
+    <p:sldId id="297" r:id="rId41"/>
   </p:sldIdLst>
   <p:sldSz cx="12192000" cy="6858000"/>
   <p:notesSz cx="6858000" cy="9144000"/>
@@ -189,7 +208,7 @@
           <a:noFill/>
           <a:extLst>
             <a:ext uri="{909E8E84-426E-40dd-AFC4-6F175D3DCCD1}">
-              <a14:hiddenFill xmlns="" xmlns:a14="http://schemas.microsoft.com/office/drawing/2010/main">
+              <a14:hiddenFill xmlns:a14="http://schemas.microsoft.com/office/drawing/2010/main" xmlns="">
                 <a:solidFill>
                   <a:srgbClr val="FFFFFF"/>
                 </a:solidFill>
@@ -248,7 +267,7 @@
             </a:ln>
             <a:extLst>
               <a:ext uri="{91240B29-F687-4f45-9708-019B960494DF}">
-                <a14:hiddenLine xmlns="" xmlns:a14="http://schemas.microsoft.com/office/drawing/2010/main" w="9525">
+                <a14:hiddenLine xmlns:a14="http://schemas.microsoft.com/office/drawing/2010/main" xmlns="" w="9525">
                   <a:solidFill>
                     <a:srgbClr val="000000"/>
                   </a:solidFill>
@@ -338,7 +357,7 @@
             </a:ln>
             <a:extLst>
               <a:ext uri="{91240B29-F687-4f45-9708-019B960494DF}">
-                <a14:hiddenLine xmlns="" xmlns:a14="http://schemas.microsoft.com/office/drawing/2010/main" w="9525">
+                <a14:hiddenLine xmlns:a14="http://schemas.microsoft.com/office/drawing/2010/main" xmlns="" w="9525">
                   <a:solidFill>
                     <a:srgbClr val="000000"/>
                   </a:solidFill>
@@ -428,7 +447,7 @@
             </a:ln>
             <a:extLst>
               <a:ext uri="{91240B29-F687-4f45-9708-019B960494DF}">
-                <a14:hiddenLine xmlns="" xmlns:a14="http://schemas.microsoft.com/office/drawing/2010/main" w="9525">
+                <a14:hiddenLine xmlns:a14="http://schemas.microsoft.com/office/drawing/2010/main" xmlns="" w="9525">
                   <a:solidFill>
                     <a:srgbClr val="000000"/>
                   </a:solidFill>
@@ -462,7 +481,7 @@
             </a:ln>
             <a:extLst>
               <a:ext uri="{91240B29-F687-4f45-9708-019B960494DF}">
-                <a14:hiddenLine xmlns="" xmlns:a14="http://schemas.microsoft.com/office/drawing/2010/main" w="9525">
+                <a14:hiddenLine xmlns:a14="http://schemas.microsoft.com/office/drawing/2010/main" xmlns="" w="9525">
                   <a:solidFill>
                     <a:srgbClr val="000000"/>
                   </a:solidFill>
@@ -552,7 +571,7 @@
             </a:ln>
             <a:extLst>
               <a:ext uri="{91240B29-F687-4f45-9708-019B960494DF}">
-                <a14:hiddenLine xmlns="" xmlns:a14="http://schemas.microsoft.com/office/drawing/2010/main" w="9525">
+                <a14:hiddenLine xmlns:a14="http://schemas.microsoft.com/office/drawing/2010/main" xmlns="" w="9525">
                   <a:solidFill>
                     <a:srgbClr val="000000"/>
                   </a:solidFill>
@@ -614,7 +633,7 @@
             </a:ln>
             <a:extLst>
               <a:ext uri="{91240B29-F687-4f45-9708-019B960494DF}">
-                <a14:hiddenLine xmlns="" xmlns:a14="http://schemas.microsoft.com/office/drawing/2010/main" w="9525">
+                <a14:hiddenLine xmlns:a14="http://schemas.microsoft.com/office/drawing/2010/main" xmlns="" w="9525">
                   <a:solidFill>
                     <a:srgbClr val="000000"/>
                   </a:solidFill>
@@ -676,7 +695,7 @@
             </a:ln>
             <a:extLst>
               <a:ext uri="{91240B29-F687-4f45-9708-019B960494DF}">
-                <a14:hiddenLine xmlns="" xmlns:a14="http://schemas.microsoft.com/office/drawing/2010/main" w="9525">
+                <a14:hiddenLine xmlns:a14="http://schemas.microsoft.com/office/drawing/2010/main" xmlns="" w="9525">
                   <a:solidFill>
                     <a:srgbClr val="000000"/>
                   </a:solidFill>
@@ -766,7 +785,7 @@
             </a:ln>
             <a:extLst>
               <a:ext uri="{91240B29-F687-4f45-9708-019B960494DF}">
-                <a14:hiddenLine xmlns="" xmlns:a14="http://schemas.microsoft.com/office/drawing/2010/main" w="9525">
+                <a14:hiddenLine xmlns:a14="http://schemas.microsoft.com/office/drawing/2010/main" xmlns="" w="9525">
                   <a:solidFill>
                     <a:srgbClr val="000000"/>
                   </a:solidFill>
@@ -828,7 +847,7 @@
             </a:ln>
             <a:extLst>
               <a:ext uri="{91240B29-F687-4f45-9708-019B960494DF}">
-                <a14:hiddenLine xmlns="" xmlns:a14="http://schemas.microsoft.com/office/drawing/2010/main" w="9525">
+                <a14:hiddenLine xmlns:a14="http://schemas.microsoft.com/office/drawing/2010/main" xmlns="" w="9525">
                   <a:solidFill>
                     <a:srgbClr val="000000"/>
                   </a:solidFill>
@@ -890,7 +909,7 @@
             </a:ln>
             <a:extLst>
               <a:ext uri="{91240B29-F687-4f45-9708-019B960494DF}">
-                <a14:hiddenLine xmlns="" xmlns:a14="http://schemas.microsoft.com/office/drawing/2010/main" w="9525">
+                <a14:hiddenLine xmlns:a14="http://schemas.microsoft.com/office/drawing/2010/main" xmlns="" w="9525">
                   <a:solidFill>
                     <a:srgbClr val="000000"/>
                   </a:solidFill>
@@ -980,7 +999,7 @@
             </a:ln>
             <a:extLst>
               <a:ext uri="{91240B29-F687-4f45-9708-019B960494DF}">
-                <a14:hiddenLine xmlns="" xmlns:a14="http://schemas.microsoft.com/office/drawing/2010/main" w="9525">
+                <a14:hiddenLine xmlns:a14="http://schemas.microsoft.com/office/drawing/2010/main" xmlns="" w="9525">
                   <a:solidFill>
                     <a:srgbClr val="000000"/>
                   </a:solidFill>
@@ -1070,7 +1089,7 @@
             </a:ln>
             <a:extLst>
               <a:ext uri="{91240B29-F687-4f45-9708-019B960494DF}">
-                <a14:hiddenLine xmlns="" xmlns:a14="http://schemas.microsoft.com/office/drawing/2010/main" w="9525">
+                <a14:hiddenLine xmlns:a14="http://schemas.microsoft.com/office/drawing/2010/main" xmlns="" w="9525">
                   <a:solidFill>
                     <a:srgbClr val="000000"/>
                   </a:solidFill>
@@ -1132,7 +1151,7 @@
             </a:ln>
             <a:extLst>
               <a:ext uri="{91240B29-F687-4f45-9708-019B960494DF}">
-                <a14:hiddenLine xmlns="" xmlns:a14="http://schemas.microsoft.com/office/drawing/2010/main" w="9525">
+                <a14:hiddenLine xmlns:a14="http://schemas.microsoft.com/office/drawing/2010/main" xmlns="" w="9525">
                   <a:solidFill>
                     <a:srgbClr val="000000"/>
                   </a:solidFill>
@@ -1242,7 +1261,7 @@
             </a:ln>
             <a:extLst>
               <a:ext uri="{91240B29-F687-4f45-9708-019B960494DF}">
-                <a14:hiddenLine xmlns="" xmlns:a14="http://schemas.microsoft.com/office/drawing/2010/main" w="9525">
+                <a14:hiddenLine xmlns:a14="http://schemas.microsoft.com/office/drawing/2010/main" xmlns="" w="9525">
                   <a:solidFill>
                     <a:srgbClr val="000000"/>
                   </a:solidFill>
@@ -1304,7 +1323,7 @@
             </a:ln>
             <a:extLst>
               <a:ext uri="{91240B29-F687-4f45-9708-019B960494DF}">
-                <a14:hiddenLine xmlns="" xmlns:a14="http://schemas.microsoft.com/office/drawing/2010/main" w="9525">
+                <a14:hiddenLine xmlns:a14="http://schemas.microsoft.com/office/drawing/2010/main" xmlns="" w="9525">
                   <a:solidFill>
                     <a:srgbClr val="000000"/>
                   </a:solidFill>
@@ -1394,7 +1413,7 @@
             </a:ln>
             <a:extLst>
               <a:ext uri="{91240B29-F687-4f45-9708-019B960494DF}">
-                <a14:hiddenLine xmlns="" xmlns:a14="http://schemas.microsoft.com/office/drawing/2010/main" w="9525">
+                <a14:hiddenLine xmlns:a14="http://schemas.microsoft.com/office/drawing/2010/main" xmlns="" w="9525">
                   <a:solidFill>
                     <a:srgbClr val="000000"/>
                   </a:solidFill>
@@ -1484,7 +1503,7 @@
             </a:ln>
             <a:extLst>
               <a:ext uri="{91240B29-F687-4f45-9708-019B960494DF}">
-                <a14:hiddenLine xmlns="" xmlns:a14="http://schemas.microsoft.com/office/drawing/2010/main" w="9525">
+                <a14:hiddenLine xmlns:a14="http://schemas.microsoft.com/office/drawing/2010/main" xmlns="" w="9525">
                   <a:solidFill>
                     <a:srgbClr val="000000"/>
                   </a:solidFill>
@@ -1546,7 +1565,7 @@
             </a:ln>
             <a:extLst>
               <a:ext uri="{91240B29-F687-4f45-9708-019B960494DF}">
-                <a14:hiddenLine xmlns="" xmlns:a14="http://schemas.microsoft.com/office/drawing/2010/main" w="9525">
+                <a14:hiddenLine xmlns:a14="http://schemas.microsoft.com/office/drawing/2010/main" xmlns="" w="9525">
                   <a:solidFill>
                     <a:srgbClr val="000000"/>
                   </a:solidFill>
@@ -1636,7 +1655,7 @@
             </a:ln>
             <a:extLst>
               <a:ext uri="{91240B29-F687-4f45-9708-019B960494DF}">
-                <a14:hiddenLine xmlns="" xmlns:a14="http://schemas.microsoft.com/office/drawing/2010/main" w="9525">
+                <a14:hiddenLine xmlns:a14="http://schemas.microsoft.com/office/drawing/2010/main" xmlns="" w="9525">
                   <a:solidFill>
                     <a:srgbClr val="000000"/>
                   </a:solidFill>
@@ -1726,7 +1745,7 @@
             </a:ln>
             <a:extLst>
               <a:ext uri="{91240B29-F687-4f45-9708-019B960494DF}">
-                <a14:hiddenLine xmlns="" xmlns:a14="http://schemas.microsoft.com/office/drawing/2010/main" w="9525">
+                <a14:hiddenLine xmlns:a14="http://schemas.microsoft.com/office/drawing/2010/main" xmlns="" w="9525">
                   <a:solidFill>
                     <a:srgbClr val="000000"/>
                   </a:solidFill>
@@ -1782,7 +1801,7 @@
             </a:ln>
             <a:extLst>
               <a:ext uri="{91240B29-F687-4f45-9708-019B960494DF}">
-                <a14:hiddenLine xmlns="" xmlns:a14="http://schemas.microsoft.com/office/drawing/2010/main" w="9525">
+                <a14:hiddenLine xmlns:a14="http://schemas.microsoft.com/office/drawing/2010/main" xmlns="" w="9525">
                   <a:solidFill>
                     <a:srgbClr val="000000"/>
                   </a:solidFill>
@@ -1872,7 +1891,7 @@
             </a:ln>
             <a:extLst>
               <a:ext uri="{91240B29-F687-4f45-9708-019B960494DF}">
-                <a14:hiddenLine xmlns="" xmlns:a14="http://schemas.microsoft.com/office/drawing/2010/main" w="9525">
+                <a14:hiddenLine xmlns:a14="http://schemas.microsoft.com/office/drawing/2010/main" xmlns="" w="9525">
                   <a:solidFill>
                     <a:srgbClr val="000000"/>
                   </a:solidFill>
@@ -1928,7 +1947,7 @@
             </a:ln>
             <a:extLst>
               <a:ext uri="{91240B29-F687-4f45-9708-019B960494DF}">
-                <a14:hiddenLine xmlns="" xmlns:a14="http://schemas.microsoft.com/office/drawing/2010/main" w="9525">
+                <a14:hiddenLine xmlns:a14="http://schemas.microsoft.com/office/drawing/2010/main" xmlns="" w="9525">
                   <a:solidFill>
                     <a:srgbClr val="000000"/>
                   </a:solidFill>
@@ -2018,7 +2037,7 @@
             </a:ln>
             <a:extLst>
               <a:ext uri="{91240B29-F687-4f45-9708-019B960494DF}">
-                <a14:hiddenLine xmlns="" xmlns:a14="http://schemas.microsoft.com/office/drawing/2010/main" w="9525">
+                <a14:hiddenLine xmlns:a14="http://schemas.microsoft.com/office/drawing/2010/main" xmlns="" w="9525">
                   <a:solidFill>
                     <a:srgbClr val="000000"/>
                   </a:solidFill>
@@ -2086,7 +2105,7 @@
             </a:ln>
             <a:extLst>
               <a:ext uri="{91240B29-F687-4f45-9708-019B960494DF}">
-                <a14:hiddenLine xmlns="" xmlns:a14="http://schemas.microsoft.com/office/drawing/2010/main" w="9525">
+                <a14:hiddenLine xmlns:a14="http://schemas.microsoft.com/office/drawing/2010/main" xmlns="" w="9525">
                   <a:solidFill>
                     <a:srgbClr val="000000"/>
                   </a:solidFill>
@@ -2176,7 +2195,7 @@
             </a:ln>
             <a:extLst>
               <a:ext uri="{91240B29-F687-4f45-9708-019B960494DF}">
-                <a14:hiddenLine xmlns="" xmlns:a14="http://schemas.microsoft.com/office/drawing/2010/main" w="9525">
+                <a14:hiddenLine xmlns:a14="http://schemas.microsoft.com/office/drawing/2010/main" xmlns="" w="9525">
                   <a:solidFill>
                     <a:srgbClr val="000000"/>
                   </a:solidFill>
@@ -2244,7 +2263,7 @@
             </a:ln>
             <a:extLst>
               <a:ext uri="{91240B29-F687-4f45-9708-019B960494DF}">
-                <a14:hiddenLine xmlns="" xmlns:a14="http://schemas.microsoft.com/office/drawing/2010/main" w="9525">
+                <a14:hiddenLine xmlns:a14="http://schemas.microsoft.com/office/drawing/2010/main" xmlns="" w="9525">
                   <a:solidFill>
                     <a:srgbClr val="000000"/>
                   </a:solidFill>
@@ -2334,7 +2353,7 @@
             </a:ln>
             <a:extLst>
               <a:ext uri="{91240B29-F687-4f45-9708-019B960494DF}">
-                <a14:hiddenLine xmlns="" xmlns:a14="http://schemas.microsoft.com/office/drawing/2010/main" w="9525">
+                <a14:hiddenLine xmlns:a14="http://schemas.microsoft.com/office/drawing/2010/main" xmlns="" w="9525">
                   <a:solidFill>
                     <a:srgbClr val="000000"/>
                   </a:solidFill>
@@ -2368,7 +2387,7 @@
             </a:ln>
             <a:extLst>
               <a:ext uri="{91240B29-F687-4f45-9708-019B960494DF}">
-                <a14:hiddenLine xmlns="" xmlns:a14="http://schemas.microsoft.com/office/drawing/2010/main" w="9525">
+                <a14:hiddenLine xmlns:a14="http://schemas.microsoft.com/office/drawing/2010/main" xmlns="" w="9525">
                   <a:solidFill>
                     <a:srgbClr val="000000"/>
                   </a:solidFill>
@@ -2458,7 +2477,7 @@
             </a:ln>
             <a:extLst>
               <a:ext uri="{91240B29-F687-4f45-9708-019B960494DF}">
-                <a14:hiddenLine xmlns="" xmlns:a14="http://schemas.microsoft.com/office/drawing/2010/main" w="9525">
+                <a14:hiddenLine xmlns:a14="http://schemas.microsoft.com/office/drawing/2010/main" xmlns="" w="9525">
                   <a:solidFill>
                     <a:srgbClr val="000000"/>
                   </a:solidFill>
@@ -2520,7 +2539,7 @@
             </a:ln>
             <a:extLst>
               <a:ext uri="{91240B29-F687-4f45-9708-019B960494DF}">
-                <a14:hiddenLine xmlns="" xmlns:a14="http://schemas.microsoft.com/office/drawing/2010/main" w="9525">
+                <a14:hiddenLine xmlns:a14="http://schemas.microsoft.com/office/drawing/2010/main" xmlns="" w="9525">
                   <a:solidFill>
                     <a:srgbClr val="000000"/>
                   </a:solidFill>
@@ -2582,7 +2601,7 @@
             </a:ln>
             <a:extLst>
               <a:ext uri="{91240B29-F687-4f45-9708-019B960494DF}">
-                <a14:hiddenLine xmlns="" xmlns:a14="http://schemas.microsoft.com/office/drawing/2010/main" w="9525">
+                <a14:hiddenLine xmlns:a14="http://schemas.microsoft.com/office/drawing/2010/main" xmlns="" w="9525">
                   <a:solidFill>
                     <a:srgbClr val="000000"/>
                   </a:solidFill>
@@ -2672,7 +2691,7 @@
             </a:ln>
             <a:extLst>
               <a:ext uri="{91240B29-F687-4f45-9708-019B960494DF}">
-                <a14:hiddenLine xmlns="" xmlns:a14="http://schemas.microsoft.com/office/drawing/2010/main" w="9525">
+                <a14:hiddenLine xmlns:a14="http://schemas.microsoft.com/office/drawing/2010/main" xmlns="" w="9525">
                   <a:solidFill>
                     <a:srgbClr val="000000"/>
                   </a:solidFill>
@@ -2740,7 +2759,7 @@
             </a:ln>
             <a:extLst>
               <a:ext uri="{91240B29-F687-4f45-9708-019B960494DF}">
-                <a14:hiddenLine xmlns="" xmlns:a14="http://schemas.microsoft.com/office/drawing/2010/main" w="9525">
+                <a14:hiddenLine xmlns:a14="http://schemas.microsoft.com/office/drawing/2010/main" xmlns="" w="9525">
                   <a:solidFill>
                     <a:srgbClr val="000000"/>
                   </a:solidFill>
@@ -2802,7 +2821,7 @@
             </a:ln>
             <a:extLst>
               <a:ext uri="{91240B29-F687-4f45-9708-019B960494DF}">
-                <a14:hiddenLine xmlns="" xmlns:a14="http://schemas.microsoft.com/office/drawing/2010/main" w="9525">
+                <a14:hiddenLine xmlns:a14="http://schemas.microsoft.com/office/drawing/2010/main" xmlns="" w="9525">
                   <a:solidFill>
                     <a:srgbClr val="000000"/>
                   </a:solidFill>
@@ -2892,7 +2911,7 @@
             </a:ln>
             <a:extLst>
               <a:ext uri="{91240B29-F687-4f45-9708-019B960494DF}">
-                <a14:hiddenLine xmlns="" xmlns:a14="http://schemas.microsoft.com/office/drawing/2010/main" w="9525">
+                <a14:hiddenLine xmlns:a14="http://schemas.microsoft.com/office/drawing/2010/main" xmlns="" w="9525">
                   <a:solidFill>
                     <a:srgbClr val="000000"/>
                   </a:solidFill>
@@ -2954,7 +2973,7 @@
             </a:ln>
             <a:extLst>
               <a:ext uri="{91240B29-F687-4f45-9708-019B960494DF}">
-                <a14:hiddenLine xmlns="" xmlns:a14="http://schemas.microsoft.com/office/drawing/2010/main" w="9525">
+                <a14:hiddenLine xmlns:a14="http://schemas.microsoft.com/office/drawing/2010/main" xmlns="" w="9525">
                   <a:solidFill>
                     <a:srgbClr val="000000"/>
                   </a:solidFill>
@@ -3044,7 +3063,7 @@
             </a:ln>
             <a:extLst>
               <a:ext uri="{91240B29-F687-4f45-9708-019B960494DF}">
-                <a14:hiddenLine xmlns="" xmlns:a14="http://schemas.microsoft.com/office/drawing/2010/main" w="9525">
+                <a14:hiddenLine xmlns:a14="http://schemas.microsoft.com/office/drawing/2010/main" xmlns="" w="9525">
                   <a:solidFill>
                     <a:srgbClr val="000000"/>
                   </a:solidFill>
@@ -3106,7 +3125,7 @@
             </a:ln>
             <a:extLst>
               <a:ext uri="{91240B29-F687-4f45-9708-019B960494DF}">
-                <a14:hiddenLine xmlns="" xmlns:a14="http://schemas.microsoft.com/office/drawing/2010/main" w="9525">
+                <a14:hiddenLine xmlns:a14="http://schemas.microsoft.com/office/drawing/2010/main" xmlns="" w="9525">
                   <a:solidFill>
                     <a:srgbClr val="000000"/>
                   </a:solidFill>
@@ -3196,7 +3215,7 @@
             </a:ln>
             <a:extLst>
               <a:ext uri="{91240B29-F687-4f45-9708-019B960494DF}">
-                <a14:hiddenLine xmlns="" xmlns:a14="http://schemas.microsoft.com/office/drawing/2010/main" w="9525">
+                <a14:hiddenLine xmlns:a14="http://schemas.microsoft.com/office/drawing/2010/main" xmlns="" w="9525">
                   <a:solidFill>
                     <a:srgbClr val="000000"/>
                   </a:solidFill>
@@ -3230,7 +3249,7 @@
             </a:ln>
             <a:extLst>
               <a:ext uri="{91240B29-F687-4f45-9708-019B960494DF}">
-                <a14:hiddenLine xmlns="" xmlns:a14="http://schemas.microsoft.com/office/drawing/2010/main" w="9525">
+                <a14:hiddenLine xmlns:a14="http://schemas.microsoft.com/office/drawing/2010/main" xmlns="" w="9525">
                   <a:solidFill>
                     <a:srgbClr val="000000"/>
                   </a:solidFill>
@@ -3295,7 +3314,7 @@
             </a:ln>
             <a:extLst>
               <a:ext uri="{91240B29-F687-4f45-9708-019B960494DF}">
-                <a14:hiddenLine xmlns="" xmlns:a14="http://schemas.microsoft.com/office/drawing/2010/main" w="9525">
+                <a14:hiddenLine xmlns:a14="http://schemas.microsoft.com/office/drawing/2010/main" xmlns="" w="9525">
                   <a:solidFill>
                     <a:srgbClr val="000000"/>
                   </a:solidFill>
@@ -3385,7 +3404,7 @@
             </a:ln>
             <a:extLst>
               <a:ext uri="{91240B29-F687-4f45-9708-019B960494DF}">
-                <a14:hiddenLine xmlns="" xmlns:a14="http://schemas.microsoft.com/office/drawing/2010/main" w="9525">
+                <a14:hiddenLine xmlns:a14="http://schemas.microsoft.com/office/drawing/2010/main" xmlns="" w="9525">
                   <a:solidFill>
                     <a:srgbClr val="000000"/>
                   </a:solidFill>
@@ -3447,7 +3466,7 @@
             </a:ln>
             <a:extLst>
               <a:ext uri="{91240B29-F687-4f45-9708-019B960494DF}">
-                <a14:hiddenLine xmlns="" xmlns:a14="http://schemas.microsoft.com/office/drawing/2010/main" w="9525">
+                <a14:hiddenLine xmlns:a14="http://schemas.microsoft.com/office/drawing/2010/main" xmlns="" w="9525">
                   <a:solidFill>
                     <a:srgbClr val="000000"/>
                   </a:solidFill>
@@ -3537,7 +3556,7 @@
             </a:ln>
             <a:extLst>
               <a:ext uri="{91240B29-F687-4f45-9708-019B960494DF}">
-                <a14:hiddenLine xmlns="" xmlns:a14="http://schemas.microsoft.com/office/drawing/2010/main" w="9525">
+                <a14:hiddenLine xmlns:a14="http://schemas.microsoft.com/office/drawing/2010/main" xmlns="" w="9525">
                   <a:solidFill>
                     <a:srgbClr val="000000"/>
                   </a:solidFill>
@@ -3627,7 +3646,7 @@
             </a:ln>
             <a:extLst>
               <a:ext uri="{91240B29-F687-4f45-9708-019B960494DF}">
-                <a14:hiddenLine xmlns="" xmlns:a14="http://schemas.microsoft.com/office/drawing/2010/main" w="9525">
+                <a14:hiddenLine xmlns:a14="http://schemas.microsoft.com/office/drawing/2010/main" xmlns="" w="9525">
                   <a:solidFill>
                     <a:srgbClr val="000000"/>
                   </a:solidFill>
@@ -3692,7 +3711,7 @@
             </a:ln>
             <a:extLst>
               <a:ext uri="{91240B29-F687-4f45-9708-019B960494DF}">
-                <a14:hiddenLine xmlns="" xmlns:a14="http://schemas.microsoft.com/office/drawing/2010/main" w="9525">
+                <a14:hiddenLine xmlns:a14="http://schemas.microsoft.com/office/drawing/2010/main" xmlns="" w="9525">
                   <a:solidFill>
                     <a:srgbClr val="000000"/>
                   </a:solidFill>
@@ -3754,7 +3773,7 @@
             </a:ln>
             <a:extLst>
               <a:ext uri="{91240B29-F687-4f45-9708-019B960494DF}">
-                <a14:hiddenLine xmlns="" xmlns:a14="http://schemas.microsoft.com/office/drawing/2010/main" w="9525">
+                <a14:hiddenLine xmlns:a14="http://schemas.microsoft.com/office/drawing/2010/main" xmlns="" w="9525">
                   <a:solidFill>
                     <a:srgbClr val="000000"/>
                   </a:solidFill>
@@ -3844,7 +3863,7 @@
             </a:ln>
             <a:extLst>
               <a:ext uri="{91240B29-F687-4f45-9708-019B960494DF}">
-                <a14:hiddenLine xmlns="" xmlns:a14="http://schemas.microsoft.com/office/drawing/2010/main" w="9525">
+                <a14:hiddenLine xmlns:a14="http://schemas.microsoft.com/office/drawing/2010/main" xmlns="" w="9525">
                   <a:solidFill>
                     <a:srgbClr val="000000"/>
                   </a:solidFill>
@@ -3934,7 +3953,7 @@
             </a:ln>
             <a:extLst>
               <a:ext uri="{91240B29-F687-4f45-9708-019B960494DF}">
-                <a14:hiddenLine xmlns="" xmlns:a14="http://schemas.microsoft.com/office/drawing/2010/main" w="9525">
+                <a14:hiddenLine xmlns:a14="http://schemas.microsoft.com/office/drawing/2010/main" xmlns="" w="9525">
                   <a:solidFill>
                     <a:srgbClr val="000000"/>
                   </a:solidFill>
@@ -3996,7 +4015,7 @@
             </a:ln>
             <a:extLst>
               <a:ext uri="{91240B29-F687-4f45-9708-019B960494DF}">
-                <a14:hiddenLine xmlns="" xmlns:a14="http://schemas.microsoft.com/office/drawing/2010/main" w="9525">
+                <a14:hiddenLine xmlns:a14="http://schemas.microsoft.com/office/drawing/2010/main" xmlns="" w="9525">
                   <a:solidFill>
                     <a:srgbClr val="000000"/>
                   </a:solidFill>
@@ -4116,7 +4135,7 @@
             </a:ln>
             <a:extLst>
               <a:ext uri="{91240B29-F687-4f45-9708-019B960494DF}">
-                <a14:hiddenLine xmlns="" xmlns:a14="http://schemas.microsoft.com/office/drawing/2010/main" w="9525">
+                <a14:hiddenLine xmlns:a14="http://schemas.microsoft.com/office/drawing/2010/main" xmlns="" w="9525">
                   <a:solidFill>
                     <a:srgbClr val="000000"/>
                   </a:solidFill>
@@ -4184,7 +4203,7 @@
             </a:ln>
             <a:extLst>
               <a:ext uri="{91240B29-F687-4f45-9708-019B960494DF}">
-                <a14:hiddenLine xmlns="" xmlns:a14="http://schemas.microsoft.com/office/drawing/2010/main" w="9525">
+                <a14:hiddenLine xmlns:a14="http://schemas.microsoft.com/office/drawing/2010/main" xmlns="" w="9525">
                   <a:solidFill>
                     <a:srgbClr val="000000"/>
                   </a:solidFill>
@@ -4274,7 +4293,7 @@
             </a:ln>
             <a:extLst>
               <a:ext uri="{91240B29-F687-4f45-9708-019B960494DF}">
-                <a14:hiddenLine xmlns="" xmlns:a14="http://schemas.microsoft.com/office/drawing/2010/main" w="9525">
+                <a14:hiddenLine xmlns:a14="http://schemas.microsoft.com/office/drawing/2010/main" xmlns="" w="9525">
                   <a:solidFill>
                     <a:srgbClr val="000000"/>
                   </a:solidFill>
@@ -4414,7 +4433,7 @@
           <a:p>
             <a:fld id="{2C231D1E-5960-4A53-9444-882AB74E44EC}" type="datetimeFigureOut">
               <a:rPr lang="ru-RU" smtClean="0"/>
-              <a:t>17.12.2024</a:t>
+              <a:t>18.12.2024</a:t>
             </a:fld>
             <a:endParaRPr lang="ru-RU"/>
           </a:p>
@@ -4681,7 +4700,7 @@
           <a:p>
             <a:fld id="{2C231D1E-5960-4A53-9444-882AB74E44EC}" type="datetimeFigureOut">
               <a:rPr lang="ru-RU" smtClean="0"/>
-              <a:t>17.12.2024</a:t>
+              <a:t>18.12.2024</a:t>
             </a:fld>
             <a:endParaRPr lang="ru-RU"/>
           </a:p>
@@ -4877,7 +4896,7 @@
           <a:p>
             <a:fld id="{2C231D1E-5960-4A53-9444-882AB74E44EC}" type="datetimeFigureOut">
               <a:rPr lang="ru-RU" smtClean="0"/>
-              <a:t>17.12.2024</a:t>
+              <a:t>18.12.2024</a:t>
             </a:fld>
             <a:endParaRPr lang="ru-RU"/>
           </a:p>
@@ -5140,7 +5159,7 @@
           <a:p>
             <a:fld id="{2C231D1E-5960-4A53-9444-882AB74E44EC}" type="datetimeFigureOut">
               <a:rPr lang="ru-RU" smtClean="0"/>
-              <a:t>17.12.2024</a:t>
+              <a:t>18.12.2024</a:t>
             </a:fld>
             <a:endParaRPr lang="ru-RU"/>
           </a:p>
@@ -5574,7 +5593,7 @@
           <a:p>
             <a:fld id="{2C231D1E-5960-4A53-9444-882AB74E44EC}" type="datetimeFigureOut">
               <a:rPr lang="ru-RU" smtClean="0"/>
-              <a:t>17.12.2024</a:t>
+              <a:t>18.12.2024</a:t>
             </a:fld>
             <a:endParaRPr lang="ru-RU"/>
           </a:p>
@@ -6120,7 +6139,7 @@
           <a:p>
             <a:fld id="{2C231D1E-5960-4A53-9444-882AB74E44EC}" type="datetimeFigureOut">
               <a:rPr lang="ru-RU" smtClean="0"/>
-              <a:t>17.12.2024</a:t>
+              <a:t>18.12.2024</a:t>
             </a:fld>
             <a:endParaRPr lang="ru-RU"/>
           </a:p>
@@ -6840,7 +6859,7 @@
           <a:p>
             <a:fld id="{2C231D1E-5960-4A53-9444-882AB74E44EC}" type="datetimeFigureOut">
               <a:rPr lang="ru-RU" smtClean="0"/>
-              <a:t>17.12.2024</a:t>
+              <a:t>18.12.2024</a:t>
             </a:fld>
             <a:endParaRPr lang="ru-RU"/>
           </a:p>
@@ -7010,7 +7029,7 @@
           <a:p>
             <a:fld id="{2C231D1E-5960-4A53-9444-882AB74E44EC}" type="datetimeFigureOut">
               <a:rPr lang="ru-RU" smtClean="0"/>
-              <a:t>17.12.2024</a:t>
+              <a:t>18.12.2024</a:t>
             </a:fld>
             <a:endParaRPr lang="ru-RU"/>
           </a:p>
@@ -7190,7 +7209,7 @@
           <a:p>
             <a:fld id="{2C231D1E-5960-4A53-9444-882AB74E44EC}" type="datetimeFigureOut">
               <a:rPr lang="ru-RU" smtClean="0"/>
-              <a:t>17.12.2024</a:t>
+              <a:t>18.12.2024</a:t>
             </a:fld>
             <a:endParaRPr lang="ru-RU"/>
           </a:p>
@@ -7360,7 +7379,7 @@
           <a:p>
             <a:fld id="{2C231D1E-5960-4A53-9444-882AB74E44EC}" type="datetimeFigureOut">
               <a:rPr lang="ru-RU" smtClean="0"/>
-              <a:t>17.12.2024</a:t>
+              <a:t>18.12.2024</a:t>
             </a:fld>
             <a:endParaRPr lang="ru-RU"/>
           </a:p>
@@ -7610,7 +7629,7 @@
           <a:p>
             <a:fld id="{2C231D1E-5960-4A53-9444-882AB74E44EC}" type="datetimeFigureOut">
               <a:rPr lang="ru-RU" smtClean="0"/>
-              <a:t>17.12.2024</a:t>
+              <a:t>18.12.2024</a:t>
             </a:fld>
             <a:endParaRPr lang="ru-RU"/>
           </a:p>
@@ -7842,7 +7861,7 @@
           <a:p>
             <a:fld id="{2C231D1E-5960-4A53-9444-882AB74E44EC}" type="datetimeFigureOut">
               <a:rPr lang="ru-RU" smtClean="0"/>
-              <a:t>17.12.2024</a:t>
+              <a:t>18.12.2024</a:t>
             </a:fld>
             <a:endParaRPr lang="ru-RU"/>
           </a:p>
@@ -8223,7 +8242,7 @@
           <a:p>
             <a:fld id="{2C231D1E-5960-4A53-9444-882AB74E44EC}" type="datetimeFigureOut">
               <a:rPr lang="ru-RU" smtClean="0"/>
-              <a:t>17.12.2024</a:t>
+              <a:t>18.12.2024</a:t>
             </a:fld>
             <a:endParaRPr lang="ru-RU"/>
           </a:p>
@@ -8341,7 +8360,7 @@
           <a:p>
             <a:fld id="{2C231D1E-5960-4A53-9444-882AB74E44EC}" type="datetimeFigureOut">
               <a:rPr lang="ru-RU" smtClean="0"/>
-              <a:t>17.12.2024</a:t>
+              <a:t>18.12.2024</a:t>
             </a:fld>
             <a:endParaRPr lang="ru-RU"/>
           </a:p>
@@ -8436,7 +8455,7 @@
           <a:p>
             <a:fld id="{2C231D1E-5960-4A53-9444-882AB74E44EC}" type="datetimeFigureOut">
               <a:rPr lang="ru-RU" smtClean="0"/>
-              <a:t>17.12.2024</a:t>
+              <a:t>18.12.2024</a:t>
             </a:fld>
             <a:endParaRPr lang="ru-RU"/>
           </a:p>
@@ -8685,7 +8704,7 @@
           <a:p>
             <a:fld id="{2C231D1E-5960-4A53-9444-882AB74E44EC}" type="datetimeFigureOut">
               <a:rPr lang="ru-RU" smtClean="0"/>
-              <a:t>17.12.2024</a:t>
+              <a:t>18.12.2024</a:t>
             </a:fld>
             <a:endParaRPr lang="ru-RU"/>
           </a:p>
@@ -8965,7 +8984,7 @@
           <a:p>
             <a:fld id="{2C231D1E-5960-4A53-9444-882AB74E44EC}" type="datetimeFigureOut">
               <a:rPr lang="ru-RU" smtClean="0"/>
-              <a:t>17.12.2024</a:t>
+              <a:t>18.12.2024</a:t>
             </a:fld>
             <a:endParaRPr lang="ru-RU"/>
           </a:p>
@@ -9088,7 +9107,7 @@
           <a:noFill/>
           <a:extLst>
             <a:ext uri="{909E8E84-426E-40dd-AFC4-6F175D3DCCD1}">
-              <a14:hiddenFill xmlns="" xmlns:a14="http://schemas.microsoft.com/office/drawing/2010/main">
+              <a14:hiddenFill xmlns:a14="http://schemas.microsoft.com/office/drawing/2010/main" xmlns="">
                 <a:solidFill>
                   <a:srgbClr val="FFFFFF"/>
                 </a:solidFill>
@@ -9162,7 +9181,7 @@
               </a:ln>
               <a:extLst>
                 <a:ext uri="{91240B29-F687-4f45-9708-019B960494DF}">
-                  <a14:hiddenLine xmlns="" xmlns:a14="http://schemas.microsoft.com/office/drawing/2010/main" w="9525">
+                  <a14:hiddenLine xmlns:a14="http://schemas.microsoft.com/office/drawing/2010/main" xmlns="" w="9525">
                     <a:solidFill>
                       <a:srgbClr val="000000"/>
                     </a:solidFill>
@@ -9252,7 +9271,7 @@
               </a:ln>
               <a:extLst>
                 <a:ext uri="{91240B29-F687-4f45-9708-019B960494DF}">
-                  <a14:hiddenLine xmlns="" xmlns:a14="http://schemas.microsoft.com/office/drawing/2010/main" w="9525">
+                  <a14:hiddenLine xmlns:a14="http://schemas.microsoft.com/office/drawing/2010/main" xmlns="" w="9525">
                     <a:solidFill>
                       <a:srgbClr val="000000"/>
                     </a:solidFill>
@@ -9342,7 +9361,7 @@
               </a:ln>
               <a:extLst>
                 <a:ext uri="{91240B29-F687-4f45-9708-019B960494DF}">
-                  <a14:hiddenLine xmlns="" xmlns:a14="http://schemas.microsoft.com/office/drawing/2010/main" w="9525">
+                  <a14:hiddenLine xmlns:a14="http://schemas.microsoft.com/office/drawing/2010/main" xmlns="" w="9525">
                     <a:solidFill>
                       <a:srgbClr val="000000"/>
                     </a:solidFill>
@@ -9404,7 +9423,7 @@
               </a:ln>
               <a:extLst>
                 <a:ext uri="{91240B29-F687-4f45-9708-019B960494DF}">
-                  <a14:hiddenLine xmlns="" xmlns:a14="http://schemas.microsoft.com/office/drawing/2010/main" w="9525">
+                  <a14:hiddenLine xmlns:a14="http://schemas.microsoft.com/office/drawing/2010/main" xmlns="" w="9525">
                     <a:solidFill>
                       <a:srgbClr val="000000"/>
                     </a:solidFill>
@@ -9494,7 +9513,7 @@
               </a:ln>
               <a:extLst>
                 <a:ext uri="{91240B29-F687-4f45-9708-019B960494DF}">
-                  <a14:hiddenLine xmlns="" xmlns:a14="http://schemas.microsoft.com/office/drawing/2010/main" w="9525">
+                  <a14:hiddenLine xmlns:a14="http://schemas.microsoft.com/office/drawing/2010/main" xmlns="" w="9525">
                     <a:solidFill>
                       <a:srgbClr val="000000"/>
                     </a:solidFill>
@@ -9556,7 +9575,7 @@
               </a:ln>
               <a:extLst>
                 <a:ext uri="{91240B29-F687-4f45-9708-019B960494DF}">
-                  <a14:hiddenLine xmlns="" xmlns:a14="http://schemas.microsoft.com/office/drawing/2010/main" w="9525">
+                  <a14:hiddenLine xmlns:a14="http://schemas.microsoft.com/office/drawing/2010/main" xmlns="" w="9525">
                     <a:solidFill>
                       <a:srgbClr val="000000"/>
                     </a:solidFill>
@@ -9618,7 +9637,7 @@
               </a:ln>
               <a:extLst>
                 <a:ext uri="{91240B29-F687-4f45-9708-019B960494DF}">
-                  <a14:hiddenLine xmlns="" xmlns:a14="http://schemas.microsoft.com/office/drawing/2010/main" w="9525">
+                  <a14:hiddenLine xmlns:a14="http://schemas.microsoft.com/office/drawing/2010/main" xmlns="" w="9525">
                     <a:solidFill>
                       <a:srgbClr val="000000"/>
                     </a:solidFill>
@@ -9708,7 +9727,7 @@
               </a:ln>
               <a:extLst>
                 <a:ext uri="{91240B29-F687-4f45-9708-019B960494DF}">
-                  <a14:hiddenLine xmlns="" xmlns:a14="http://schemas.microsoft.com/office/drawing/2010/main" w="9525">
+                  <a14:hiddenLine xmlns:a14="http://schemas.microsoft.com/office/drawing/2010/main" xmlns="" w="9525">
                     <a:solidFill>
                       <a:srgbClr val="000000"/>
                     </a:solidFill>
@@ -9798,7 +9817,7 @@
               </a:ln>
               <a:extLst>
                 <a:ext uri="{91240B29-F687-4f45-9708-019B960494DF}">
-                  <a14:hiddenLine xmlns="" xmlns:a14="http://schemas.microsoft.com/office/drawing/2010/main" w="9525">
+                  <a14:hiddenLine xmlns:a14="http://schemas.microsoft.com/office/drawing/2010/main" xmlns="" w="9525">
                     <a:solidFill>
                       <a:srgbClr val="000000"/>
                     </a:solidFill>
@@ -9860,7 +9879,7 @@
               </a:ln>
               <a:extLst>
                 <a:ext uri="{91240B29-F687-4f45-9708-019B960494DF}">
-                  <a14:hiddenLine xmlns="" xmlns:a14="http://schemas.microsoft.com/office/drawing/2010/main" w="9525">
+                  <a14:hiddenLine xmlns:a14="http://schemas.microsoft.com/office/drawing/2010/main" xmlns="" w="9525">
                     <a:solidFill>
                       <a:srgbClr val="000000"/>
                     </a:solidFill>
@@ -9970,7 +9989,7 @@
               </a:ln>
               <a:extLst>
                 <a:ext uri="{91240B29-F687-4f45-9708-019B960494DF}">
-                  <a14:hiddenLine xmlns="" xmlns:a14="http://schemas.microsoft.com/office/drawing/2010/main" w="9525">
+                  <a14:hiddenLine xmlns:a14="http://schemas.microsoft.com/office/drawing/2010/main" xmlns="" w="9525">
                     <a:solidFill>
                       <a:srgbClr val="000000"/>
                     </a:solidFill>
@@ -10054,7 +10073,7 @@
               </a:ln>
               <a:extLst>
                 <a:ext uri="{91240B29-F687-4f45-9708-019B960494DF}">
-                  <a14:hiddenLine xmlns="" xmlns:a14="http://schemas.microsoft.com/office/drawing/2010/main" w="9525">
+                  <a14:hiddenLine xmlns:a14="http://schemas.microsoft.com/office/drawing/2010/main" xmlns="" w="9525">
                     <a:solidFill>
                       <a:srgbClr val="000000"/>
                     </a:solidFill>
@@ -10116,7 +10135,7 @@
               </a:ln>
               <a:extLst>
                 <a:ext uri="{91240B29-F687-4f45-9708-019B960494DF}">
-                  <a14:hiddenLine xmlns="" xmlns:a14="http://schemas.microsoft.com/office/drawing/2010/main" w="9525">
+                  <a14:hiddenLine xmlns:a14="http://schemas.microsoft.com/office/drawing/2010/main" xmlns="" w="9525">
                     <a:solidFill>
                       <a:srgbClr val="000000"/>
                     </a:solidFill>
@@ -10178,7 +10197,7 @@
               </a:ln>
               <a:extLst>
                 <a:ext uri="{91240B29-F687-4f45-9708-019B960494DF}">
-                  <a14:hiddenLine xmlns="" xmlns:a14="http://schemas.microsoft.com/office/drawing/2010/main" w="9525">
+                  <a14:hiddenLine xmlns:a14="http://schemas.microsoft.com/office/drawing/2010/main" xmlns="" w="9525">
                     <a:solidFill>
                       <a:srgbClr val="000000"/>
                     </a:solidFill>
@@ -10268,7 +10287,7 @@
               </a:ln>
               <a:extLst>
                 <a:ext uri="{91240B29-F687-4f45-9708-019B960494DF}">
-                  <a14:hiddenLine xmlns="" xmlns:a14="http://schemas.microsoft.com/office/drawing/2010/main" w="9525">
+                  <a14:hiddenLine xmlns:a14="http://schemas.microsoft.com/office/drawing/2010/main" xmlns="" w="9525">
                     <a:solidFill>
                       <a:srgbClr val="000000"/>
                     </a:solidFill>
@@ -10302,7 +10321,7 @@
               </a:ln>
               <a:extLst>
                 <a:ext uri="{91240B29-F687-4f45-9708-019B960494DF}">
-                  <a14:hiddenLine xmlns="" xmlns:a14="http://schemas.microsoft.com/office/drawing/2010/main" w="9525">
+                  <a14:hiddenLine xmlns:a14="http://schemas.microsoft.com/office/drawing/2010/main" xmlns="" w="9525">
                     <a:solidFill>
                       <a:srgbClr val="000000"/>
                     </a:solidFill>
@@ -10367,7 +10386,7 @@
               </a:ln>
               <a:extLst>
                 <a:ext uri="{91240B29-F687-4f45-9708-019B960494DF}">
-                  <a14:hiddenLine xmlns="" xmlns:a14="http://schemas.microsoft.com/office/drawing/2010/main" w="9525">
+                  <a14:hiddenLine xmlns:a14="http://schemas.microsoft.com/office/drawing/2010/main" xmlns="" w="9525">
                     <a:solidFill>
                       <a:srgbClr val="000000"/>
                     </a:solidFill>
@@ -10457,7 +10476,7 @@
               </a:ln>
               <a:extLst>
                 <a:ext uri="{91240B29-F687-4f45-9708-019B960494DF}">
-                  <a14:hiddenLine xmlns="" xmlns:a14="http://schemas.microsoft.com/office/drawing/2010/main" w="9525">
+                  <a14:hiddenLine xmlns:a14="http://schemas.microsoft.com/office/drawing/2010/main" xmlns="" w="9525">
                     <a:solidFill>
                       <a:srgbClr val="000000"/>
                     </a:solidFill>
@@ -10519,7 +10538,7 @@
               </a:ln>
               <a:extLst>
                 <a:ext uri="{91240B29-F687-4f45-9708-019B960494DF}">
-                  <a14:hiddenLine xmlns="" xmlns:a14="http://schemas.microsoft.com/office/drawing/2010/main" w="9525">
+                  <a14:hiddenLine xmlns:a14="http://schemas.microsoft.com/office/drawing/2010/main" xmlns="" w="9525">
                     <a:solidFill>
                       <a:srgbClr val="000000"/>
                     </a:solidFill>
@@ -10609,7 +10628,7 @@
               </a:ln>
               <a:extLst>
                 <a:ext uri="{91240B29-F687-4f45-9708-019B960494DF}">
-                  <a14:hiddenLine xmlns="" xmlns:a14="http://schemas.microsoft.com/office/drawing/2010/main" w="9525">
+                  <a14:hiddenLine xmlns:a14="http://schemas.microsoft.com/office/drawing/2010/main" xmlns="" w="9525">
                     <a:solidFill>
                       <a:srgbClr val="000000"/>
                     </a:solidFill>
@@ -10674,7 +10693,7 @@
               </a:ln>
               <a:extLst>
                 <a:ext uri="{91240B29-F687-4f45-9708-019B960494DF}">
-                  <a14:hiddenLine xmlns="" xmlns:a14="http://schemas.microsoft.com/office/drawing/2010/main" w="9525">
+                  <a14:hiddenLine xmlns:a14="http://schemas.microsoft.com/office/drawing/2010/main" xmlns="" w="9525">
                     <a:solidFill>
                       <a:srgbClr val="000000"/>
                     </a:solidFill>
@@ -10736,7 +10755,7 @@
               </a:ln>
               <a:extLst>
                 <a:ext uri="{91240B29-F687-4f45-9708-019B960494DF}">
-                  <a14:hiddenLine xmlns="" xmlns:a14="http://schemas.microsoft.com/office/drawing/2010/main" w="9525">
+                  <a14:hiddenLine xmlns:a14="http://schemas.microsoft.com/office/drawing/2010/main" xmlns="" w="9525">
                     <a:solidFill>
                       <a:srgbClr val="000000"/>
                     </a:solidFill>
@@ -10826,7 +10845,7 @@
               </a:ln>
               <a:extLst>
                 <a:ext uri="{91240B29-F687-4f45-9708-019B960494DF}">
-                  <a14:hiddenLine xmlns="" xmlns:a14="http://schemas.microsoft.com/office/drawing/2010/main" w="9525">
+                  <a14:hiddenLine xmlns:a14="http://schemas.microsoft.com/office/drawing/2010/main" xmlns="" w="9525">
                     <a:solidFill>
                       <a:srgbClr val="000000"/>
                     </a:solidFill>
@@ -10916,7 +10935,7 @@
               </a:ln>
               <a:extLst>
                 <a:ext uri="{91240B29-F687-4f45-9708-019B960494DF}">
-                  <a14:hiddenLine xmlns="" xmlns:a14="http://schemas.microsoft.com/office/drawing/2010/main" w="9525">
+                  <a14:hiddenLine xmlns:a14="http://schemas.microsoft.com/office/drawing/2010/main" xmlns="" w="9525">
                     <a:solidFill>
                       <a:srgbClr val="000000"/>
                     </a:solidFill>
@@ -10981,7 +11000,7 @@
               </a:ln>
               <a:extLst>
                 <a:ext uri="{91240B29-F687-4f45-9708-019B960494DF}">
-                  <a14:hiddenLine xmlns="" xmlns:a14="http://schemas.microsoft.com/office/drawing/2010/main" w="9525">
+                  <a14:hiddenLine xmlns:a14="http://schemas.microsoft.com/office/drawing/2010/main" xmlns="" w="9525">
                     <a:solidFill>
                       <a:srgbClr val="000000"/>
                     </a:solidFill>
@@ -11101,7 +11120,7 @@
               </a:ln>
               <a:extLst>
                 <a:ext uri="{91240B29-F687-4f45-9708-019B960494DF}">
-                  <a14:hiddenLine xmlns="" xmlns:a14="http://schemas.microsoft.com/office/drawing/2010/main" w="9525">
+                  <a14:hiddenLine xmlns:a14="http://schemas.microsoft.com/office/drawing/2010/main" xmlns="" w="9525">
                     <a:solidFill>
                       <a:srgbClr val="000000"/>
                     </a:solidFill>
@@ -11182,7 +11201,7 @@
               </a:ln>
               <a:extLst>
                 <a:ext uri="{91240B29-F687-4f45-9708-019B960494DF}">
-                  <a14:hiddenLine xmlns="" xmlns:a14="http://schemas.microsoft.com/office/drawing/2010/main" w="9525">
+                  <a14:hiddenLine xmlns:a14="http://schemas.microsoft.com/office/drawing/2010/main" xmlns="" w="9525">
                     <a:solidFill>
                       <a:srgbClr val="000000"/>
                     </a:solidFill>
@@ -11297,7 +11316,7 @@
               </a:ln>
               <a:extLst>
                 <a:ext uri="{91240B29-F687-4f45-9708-019B960494DF}">
-                  <a14:hiddenLine xmlns="" xmlns:a14="http://schemas.microsoft.com/office/drawing/2010/main" w="9525">
+                  <a14:hiddenLine xmlns:a14="http://schemas.microsoft.com/office/drawing/2010/main" xmlns="" w="9525">
                     <a:solidFill>
                       <a:srgbClr val="000000"/>
                     </a:solidFill>
@@ -11387,7 +11406,7 @@
               </a:ln>
               <a:extLst>
                 <a:ext uri="{91240B29-F687-4f45-9708-019B960494DF}">
-                  <a14:hiddenLine xmlns="" xmlns:a14="http://schemas.microsoft.com/office/drawing/2010/main" w="9525">
+                  <a14:hiddenLine xmlns:a14="http://schemas.microsoft.com/office/drawing/2010/main" xmlns="" w="9525">
                     <a:solidFill>
                       <a:srgbClr val="000000"/>
                     </a:solidFill>
@@ -11452,7 +11471,7 @@
               </a:ln>
               <a:extLst>
                 <a:ext uri="{91240B29-F687-4f45-9708-019B960494DF}">
-                  <a14:hiddenLine xmlns="" xmlns:a14="http://schemas.microsoft.com/office/drawing/2010/main" w="9525">
+                  <a14:hiddenLine xmlns:a14="http://schemas.microsoft.com/office/drawing/2010/main" xmlns="" w="9525">
                     <a:solidFill>
                       <a:srgbClr val="000000"/>
                     </a:solidFill>
@@ -11542,7 +11561,7 @@
               </a:ln>
               <a:extLst>
                 <a:ext uri="{91240B29-F687-4f45-9708-019B960494DF}">
-                  <a14:hiddenLine xmlns="" xmlns:a14="http://schemas.microsoft.com/office/drawing/2010/main" w="9525">
+                  <a14:hiddenLine xmlns:a14="http://schemas.microsoft.com/office/drawing/2010/main" xmlns="" w="9525">
                     <a:solidFill>
                       <a:srgbClr val="000000"/>
                     </a:solidFill>
@@ -11610,7 +11629,7 @@
               </a:ln>
               <a:extLst>
                 <a:ext uri="{91240B29-F687-4f45-9708-019B960494DF}">
-                  <a14:hiddenLine xmlns="" xmlns:a14="http://schemas.microsoft.com/office/drawing/2010/main" w="9525">
+                  <a14:hiddenLine xmlns:a14="http://schemas.microsoft.com/office/drawing/2010/main" xmlns="" w="9525">
                     <a:solidFill>
                       <a:srgbClr val="000000"/>
                     </a:solidFill>
@@ -11700,7 +11719,7 @@
               </a:ln>
               <a:extLst>
                 <a:ext uri="{91240B29-F687-4f45-9708-019B960494DF}">
-                  <a14:hiddenLine xmlns="" xmlns:a14="http://schemas.microsoft.com/office/drawing/2010/main" w="9525">
+                  <a14:hiddenLine xmlns:a14="http://schemas.microsoft.com/office/drawing/2010/main" xmlns="" w="9525">
                     <a:solidFill>
                       <a:srgbClr val="000000"/>
                     </a:solidFill>
@@ -11768,7 +11787,7 @@
               </a:ln>
               <a:extLst>
                 <a:ext uri="{91240B29-F687-4f45-9708-019B960494DF}">
-                  <a14:hiddenLine xmlns="" xmlns:a14="http://schemas.microsoft.com/office/drawing/2010/main" w="9525">
+                  <a14:hiddenLine xmlns:a14="http://schemas.microsoft.com/office/drawing/2010/main" xmlns="" w="9525">
                     <a:solidFill>
                       <a:srgbClr val="000000"/>
                     </a:solidFill>
@@ -11858,7 +11877,7 @@
               </a:ln>
               <a:extLst>
                 <a:ext uri="{91240B29-F687-4f45-9708-019B960494DF}">
-                  <a14:hiddenLine xmlns="" xmlns:a14="http://schemas.microsoft.com/office/drawing/2010/main" w="9525">
+                  <a14:hiddenLine xmlns:a14="http://schemas.microsoft.com/office/drawing/2010/main" xmlns="" w="9525">
                     <a:solidFill>
                       <a:srgbClr val="000000"/>
                     </a:solidFill>
@@ -11892,7 +11911,7 @@
               </a:ln>
               <a:extLst>
                 <a:ext uri="{91240B29-F687-4f45-9708-019B960494DF}">
-                  <a14:hiddenLine xmlns="" xmlns:a14="http://schemas.microsoft.com/office/drawing/2010/main" w="9525">
+                  <a14:hiddenLine xmlns:a14="http://schemas.microsoft.com/office/drawing/2010/main" xmlns="" w="9525">
                     <a:solidFill>
                       <a:srgbClr val="000000"/>
                     </a:solidFill>
@@ -12032,7 +12051,7 @@
           <a:p>
             <a:fld id="{2C231D1E-5960-4A53-9444-882AB74E44EC}" type="datetimeFigureOut">
               <a:rPr lang="ru-RU" smtClean="0"/>
-              <a:t>17.12.2024</a:t>
+              <a:t>18.12.2024</a:t>
             </a:fld>
             <a:endParaRPr lang="ru-RU"/>
           </a:p>
@@ -12532,6 +12551,126 @@
           <p:cNvPr id="2" name="Title 1">
             <a:extLst>
               <a:ext uri="{FF2B5EF4-FFF2-40B4-BE49-F238E27FC236}">
+                <a16:creationId xmlns:a16="http://schemas.microsoft.com/office/drawing/2014/main" id="{E9AF73FB-1562-4FB3-8542-EDBE824EE411}"/>
+              </a:ext>
+            </a:extLst>
+          </p:cNvPr>
+          <p:cNvSpPr>
+            <a:spLocks noGrp="1"/>
+          </p:cNvSpPr>
+          <p:nvPr>
+            <p:ph type="title"/>
+          </p:nvPr>
+        </p:nvSpPr>
+        <p:spPr/>
+        <p:txBody>
+          <a:bodyPr/>
+          <a:lstStyle/>
+          <a:p>
+            <a:r>
+              <a:rPr lang="ru-RU" dirty="0"/>
+              <a:t>Объяснение кода</a:t>
+            </a:r>
+          </a:p>
+        </p:txBody>
+      </p:sp>
+      <p:pic>
+        <p:nvPicPr>
+          <p:cNvPr id="4" name="Content Placeholder 3">
+            <a:extLst>
+              <a:ext uri="{FF2B5EF4-FFF2-40B4-BE49-F238E27FC236}">
+                <a16:creationId xmlns:a16="http://schemas.microsoft.com/office/drawing/2014/main" id="{D75F99D4-B6EB-4B1A-9AE6-0948782C9F06}"/>
+              </a:ext>
+            </a:extLst>
+          </p:cNvPr>
+          <p:cNvPicPr>
+            <a:picLocks noGrp="1" noChangeAspect="1"/>
+          </p:cNvPicPr>
+          <p:nvPr>
+            <p:ph idx="1"/>
+          </p:nvPr>
+        </p:nvPicPr>
+        <p:blipFill>
+          <a:blip r:embed="rId2"/>
+          <a:stretch>
+            <a:fillRect/>
+          </a:stretch>
+        </p:blipFill>
+        <p:spPr>
+          <a:xfrm>
+            <a:off x="1055197" y="2093244"/>
+            <a:ext cx="4586287" cy="4146238"/>
+          </a:xfrm>
+          <a:prstGeom prst="rect">
+            <a:avLst/>
+          </a:prstGeom>
+        </p:spPr>
+      </p:pic>
+      <p:pic>
+        <p:nvPicPr>
+          <p:cNvPr id="5" name="Picture 4">
+            <a:extLst>
+              <a:ext uri="{FF2B5EF4-FFF2-40B4-BE49-F238E27FC236}">
+                <a16:creationId xmlns:a16="http://schemas.microsoft.com/office/drawing/2014/main" id="{6BA1301D-3FA0-4EA9-AAD2-ACA5CF49742A}"/>
+              </a:ext>
+            </a:extLst>
+          </p:cNvPr>
+          <p:cNvPicPr>
+            <a:picLocks noChangeAspect="1"/>
+          </p:cNvPicPr>
+          <p:nvPr/>
+        </p:nvPicPr>
+        <p:blipFill>
+          <a:blip r:embed="rId3"/>
+          <a:stretch>
+            <a:fillRect/>
+          </a:stretch>
+        </p:blipFill>
+        <p:spPr>
+          <a:xfrm>
+            <a:off x="5727700" y="1003456"/>
+            <a:ext cx="5405927" cy="5236026"/>
+          </a:xfrm>
+          <a:prstGeom prst="rect">
+            <a:avLst/>
+          </a:prstGeom>
+        </p:spPr>
+      </p:pic>
+    </p:spTree>
+    <p:extLst>
+      <p:ext uri="{BB962C8B-B14F-4D97-AF65-F5344CB8AC3E}">
+        <p14:creationId xmlns:p14="http://schemas.microsoft.com/office/powerpoint/2010/main" val="1490703728"/>
+      </p:ext>
+    </p:extLst>
+  </p:cSld>
+  <p:clrMapOvr>
+    <a:masterClrMapping/>
+  </p:clrMapOvr>
+</p:sld>
+</file>
+
+<file path=ppt/slides/slide11.xml><?xml version="1.0" encoding="utf-8"?>
+<p:sld xmlns:a="http://schemas.openxmlformats.org/drawingml/2006/main" xmlns:r="http://schemas.openxmlformats.org/officeDocument/2006/relationships" xmlns:p="http://schemas.openxmlformats.org/presentationml/2006/main">
+  <p:cSld>
+    <p:spTree>
+      <p:nvGrpSpPr>
+        <p:cNvPr id="1" name=""/>
+        <p:cNvGrpSpPr/>
+        <p:nvPr/>
+      </p:nvGrpSpPr>
+      <p:grpSpPr>
+        <a:xfrm>
+          <a:off x="0" y="0"/>
+          <a:ext cx="0" cy="0"/>
+          <a:chOff x="0" y="0"/>
+          <a:chExt cx="0" cy="0"/>
+        </a:xfrm>
+      </p:grpSpPr>
+      <p:sp>
+        <p:nvSpPr>
+          <p:cNvPr id="2" name="Title 1">
+            <a:extLst>
+              <a:ext uri="{FF2B5EF4-FFF2-40B4-BE49-F238E27FC236}">
                 <a16:creationId xmlns:a16="http://schemas.microsoft.com/office/drawing/2014/main" id="{7DB994E0-68EF-4766-B58E-E029090173EE}"/>
               </a:ext>
             </a:extLst>
@@ -12549,7 +12688,7 @@
           <a:lstStyle/>
           <a:p>
             <a:r>
-              <a:rPr lang="ru-RU" dirty="0"/>
+              <a:rPr lang="ru-RU" cap="none" dirty="0"/>
               <a:t>Написание кода</a:t>
             </a:r>
           </a:p>
@@ -12660,7 +12799,7 @@
 </p:sld>
 </file>
 
-<file path=ppt/slides/slide11.xml><?xml version="1.0" encoding="utf-8"?>
+<file path=ppt/slides/slide12.xml><?xml version="1.0" encoding="utf-8"?>
 <p:sld xmlns:a="http://schemas.openxmlformats.org/drawingml/2006/main" xmlns:r="http://schemas.openxmlformats.org/officeDocument/2006/relationships" xmlns:p="http://schemas.openxmlformats.org/presentationml/2006/main">
   <p:cSld>
     <p:spTree>
@@ -12699,7 +12838,7 @@
           <a:lstStyle/>
           <a:p>
             <a:r>
-              <a:rPr lang="ru-RU" dirty="0"/>
+              <a:rPr lang="ru-RU" cap="none" dirty="0"/>
               <a:t>Важность контекста</a:t>
             </a:r>
           </a:p>
@@ -12794,7 +12933,7 @@
 </p:sld>
 </file>
 
-<file path=ppt/slides/slide12.xml><?xml version="1.0" encoding="utf-8"?>
+<file path=ppt/slides/slide13.xml><?xml version="1.0" encoding="utf-8"?>
 <p:sld xmlns:a="http://schemas.openxmlformats.org/drawingml/2006/main" xmlns:r="http://schemas.openxmlformats.org/officeDocument/2006/relationships" xmlns:p="http://schemas.openxmlformats.org/presentationml/2006/main">
   <p:cSld>
     <p:spTree>
@@ -12833,7 +12972,7 @@
           <a:lstStyle/>
           <a:p>
             <a:r>
-              <a:rPr lang="ru-RU" dirty="0"/>
+              <a:rPr lang="ru-RU" cap="none" dirty="0"/>
               <a:t>Написание тестов</a:t>
             </a:r>
           </a:p>
@@ -13002,7 +13141,7 @@
 </p:sld>
 </file>
 
-<file path=ppt/slides/slide13.xml><?xml version="1.0" encoding="utf-8"?>
+<file path=ppt/slides/slide14.xml><?xml version="1.0" encoding="utf-8"?>
 <p:sld xmlns:a="http://schemas.openxmlformats.org/drawingml/2006/main" xmlns:r="http://schemas.openxmlformats.org/officeDocument/2006/relationships" xmlns:p="http://schemas.openxmlformats.org/presentationml/2006/main">
   <p:cSld>
     <p:spTree>
@@ -13129,7 +13268,7 @@
 </p:sld>
 </file>
 
-<file path=ppt/slides/slide14.xml><?xml version="1.0" encoding="utf-8"?>
+<file path=ppt/slides/slide15.xml><?xml version="1.0" encoding="utf-8"?>
 <p:sld xmlns:a="http://schemas.openxmlformats.org/drawingml/2006/main" xmlns:r="http://schemas.openxmlformats.org/officeDocument/2006/relationships" xmlns:p="http://schemas.openxmlformats.org/presentationml/2006/main">
   <p:cSld>
     <p:spTree>
@@ -13281,7 +13420,7 @@
 </p:sld>
 </file>
 
-<file path=ppt/slides/slide15.xml><?xml version="1.0" encoding="utf-8"?>
+<file path=ppt/slides/slide16.xml><?xml version="1.0" encoding="utf-8"?>
 <p:sld xmlns:a="http://schemas.openxmlformats.org/drawingml/2006/main" xmlns:r="http://schemas.openxmlformats.org/officeDocument/2006/relationships" xmlns:p="http://schemas.openxmlformats.org/presentationml/2006/main">
   <p:cSld>
     <p:spTree>
@@ -13402,7 +13541,7 @@
 </p:sld>
 </file>
 
-<file path=ppt/slides/slide16.xml><?xml version="1.0" encoding="utf-8"?>
+<file path=ppt/slides/slide17.xml><?xml version="1.0" encoding="utf-8"?>
 <p:sld xmlns:a="http://schemas.openxmlformats.org/drawingml/2006/main" xmlns:r="http://schemas.openxmlformats.org/officeDocument/2006/relationships" xmlns:p="http://schemas.openxmlformats.org/presentationml/2006/main">
   <p:cSld>
     <p:spTree>
@@ -13573,7 +13712,7 @@
 </p:sld>
 </file>
 
-<file path=ppt/slides/slide17.xml><?xml version="1.0" encoding="utf-8"?>
+<file path=ppt/slides/slide18.xml><?xml version="1.0" encoding="utf-8"?>
 <p:sld xmlns:a="http://schemas.openxmlformats.org/drawingml/2006/main" xmlns:r="http://schemas.openxmlformats.org/officeDocument/2006/relationships" xmlns:p="http://schemas.openxmlformats.org/presentationml/2006/main">
   <p:cSld>
     <p:spTree>
@@ -13663,7 +13802,7 @@
 </p:sld>
 </file>
 
-<file path=ppt/slides/slide18.xml><?xml version="1.0" encoding="utf-8"?>
+<file path=ppt/slides/slide19.xml><?xml version="1.0" encoding="utf-8"?>
 <p:sld xmlns:a="http://schemas.openxmlformats.org/drawingml/2006/main" xmlns:r="http://schemas.openxmlformats.org/officeDocument/2006/relationships" xmlns:p="http://schemas.openxmlformats.org/presentationml/2006/main">
   <p:cSld>
     <p:spTree>
@@ -13981,102 +14120,6 @@
     <p:extLst>
       <p:ext uri="{BB962C8B-B14F-4D97-AF65-F5344CB8AC3E}">
         <p14:creationId xmlns:p14="http://schemas.microsoft.com/office/powerpoint/2010/main" val="142262341"/>
-      </p:ext>
-    </p:extLst>
-  </p:cSld>
-  <p:clrMapOvr>
-    <a:masterClrMapping/>
-  </p:clrMapOvr>
-</p:sld>
-</file>
-
-<file path=ppt/slides/slide19.xml><?xml version="1.0" encoding="utf-8"?>
-<p:sld xmlns:a="http://schemas.openxmlformats.org/drawingml/2006/main" xmlns:r="http://schemas.openxmlformats.org/officeDocument/2006/relationships" xmlns:p="http://schemas.openxmlformats.org/presentationml/2006/main">
-  <p:cSld>
-    <p:spTree>
-      <p:nvGrpSpPr>
-        <p:cNvPr id="1" name=""/>
-        <p:cNvGrpSpPr/>
-        <p:nvPr/>
-      </p:nvGrpSpPr>
-      <p:grpSpPr>
-        <a:xfrm>
-          <a:off x="0" y="0"/>
-          <a:ext cx="0" cy="0"/>
-          <a:chOff x="0" y="0"/>
-          <a:chExt cx="0" cy="0"/>
-        </a:xfrm>
-      </p:grpSpPr>
-      <p:sp>
-        <p:nvSpPr>
-          <p:cNvPr id="2" name="Title 1">
-            <a:extLst>
-              <a:ext uri="{FF2B5EF4-FFF2-40B4-BE49-F238E27FC236}">
-                <a16:creationId xmlns:a16="http://schemas.microsoft.com/office/drawing/2014/main" id="{714E32F7-F2ED-488C-8269-CD560BF78613}"/>
-              </a:ext>
-            </a:extLst>
-          </p:cNvPr>
-          <p:cNvSpPr>
-            <a:spLocks noGrp="1"/>
-          </p:cNvSpPr>
-          <p:nvPr>
-            <p:ph type="title"/>
-          </p:nvPr>
-        </p:nvSpPr>
-        <p:spPr/>
-        <p:txBody>
-          <a:bodyPr/>
-          <a:lstStyle/>
-          <a:p>
-            <a:r>
-              <a:rPr lang="ru-RU" cap="none" dirty="0">
-                <a:effectLst>
-                  <a:outerShdw blurRad="38100" dist="38100" dir="2700000" algn="tl">
-                    <a:srgbClr val="000000">
-                      <a:alpha val="43137"/>
-                    </a:srgbClr>
-                  </a:outerShdw>
-                </a:effectLst>
-              </a:rPr>
-              <a:t>Чат с документом</a:t>
-            </a:r>
-          </a:p>
-        </p:txBody>
-      </p:sp>
-      <p:pic>
-        <p:nvPicPr>
-          <p:cNvPr id="7" name="Picture 6">
-            <a:extLst>
-              <a:ext uri="{FF2B5EF4-FFF2-40B4-BE49-F238E27FC236}">
-                <a16:creationId xmlns:a16="http://schemas.microsoft.com/office/drawing/2014/main" id="{B81088B5-F7C4-496E-A855-FF5AA2B1202F}"/>
-              </a:ext>
-            </a:extLst>
-          </p:cNvPr>
-          <p:cNvPicPr>
-            <a:picLocks noChangeAspect="1"/>
-          </p:cNvPicPr>
-          <p:nvPr/>
-        </p:nvPicPr>
-        <p:blipFill>
-          <a:blip r:embed="rId2"/>
-          <a:stretch>
-            <a:fillRect/>
-          </a:stretch>
-        </p:blipFill>
-        <p:spPr>
-          <a:xfrm>
-            <a:off x="2127363" y="2097088"/>
-            <a:ext cx="7937273" cy="4296029"/>
-          </a:xfrm>
-          <a:prstGeom prst="rect">
-            <a:avLst/>
-          </a:prstGeom>
-        </p:spPr>
-      </p:pic>
-    </p:spTree>
-    <p:extLst>
-      <p:ext uri="{BB962C8B-B14F-4D97-AF65-F5344CB8AC3E}">
-        <p14:creationId xmlns:p14="http://schemas.microsoft.com/office/powerpoint/2010/main" val="3169417234"/>
       </p:ext>
     </p:extLst>
   </p:cSld>
@@ -14315,6 +14358,102 @@
 </file>
 
 <file path=ppt/slides/slide20.xml><?xml version="1.0" encoding="utf-8"?>
+<p:sld xmlns:a="http://schemas.openxmlformats.org/drawingml/2006/main" xmlns:r="http://schemas.openxmlformats.org/officeDocument/2006/relationships" xmlns:p="http://schemas.openxmlformats.org/presentationml/2006/main">
+  <p:cSld>
+    <p:spTree>
+      <p:nvGrpSpPr>
+        <p:cNvPr id="1" name=""/>
+        <p:cNvGrpSpPr/>
+        <p:nvPr/>
+      </p:nvGrpSpPr>
+      <p:grpSpPr>
+        <a:xfrm>
+          <a:off x="0" y="0"/>
+          <a:ext cx="0" cy="0"/>
+          <a:chOff x="0" y="0"/>
+          <a:chExt cx="0" cy="0"/>
+        </a:xfrm>
+      </p:grpSpPr>
+      <p:sp>
+        <p:nvSpPr>
+          <p:cNvPr id="2" name="Title 1">
+            <a:extLst>
+              <a:ext uri="{FF2B5EF4-FFF2-40B4-BE49-F238E27FC236}">
+                <a16:creationId xmlns:a16="http://schemas.microsoft.com/office/drawing/2014/main" id="{714E32F7-F2ED-488C-8269-CD560BF78613}"/>
+              </a:ext>
+            </a:extLst>
+          </p:cNvPr>
+          <p:cNvSpPr>
+            <a:spLocks noGrp="1"/>
+          </p:cNvSpPr>
+          <p:nvPr>
+            <p:ph type="title"/>
+          </p:nvPr>
+        </p:nvSpPr>
+        <p:spPr/>
+        <p:txBody>
+          <a:bodyPr/>
+          <a:lstStyle/>
+          <a:p>
+            <a:r>
+              <a:rPr lang="ru-RU" cap="none" dirty="0">
+                <a:effectLst>
+                  <a:outerShdw blurRad="38100" dist="38100" dir="2700000" algn="tl">
+                    <a:srgbClr val="000000">
+                      <a:alpha val="43137"/>
+                    </a:srgbClr>
+                  </a:outerShdw>
+                </a:effectLst>
+              </a:rPr>
+              <a:t>Чат с документом</a:t>
+            </a:r>
+          </a:p>
+        </p:txBody>
+      </p:sp>
+      <p:pic>
+        <p:nvPicPr>
+          <p:cNvPr id="7" name="Picture 6">
+            <a:extLst>
+              <a:ext uri="{FF2B5EF4-FFF2-40B4-BE49-F238E27FC236}">
+                <a16:creationId xmlns:a16="http://schemas.microsoft.com/office/drawing/2014/main" id="{B81088B5-F7C4-496E-A855-FF5AA2B1202F}"/>
+              </a:ext>
+            </a:extLst>
+          </p:cNvPr>
+          <p:cNvPicPr>
+            <a:picLocks noChangeAspect="1"/>
+          </p:cNvPicPr>
+          <p:nvPr/>
+        </p:nvPicPr>
+        <p:blipFill>
+          <a:blip r:embed="rId2"/>
+          <a:stretch>
+            <a:fillRect/>
+          </a:stretch>
+        </p:blipFill>
+        <p:spPr>
+          <a:xfrm>
+            <a:off x="2127363" y="2097088"/>
+            <a:ext cx="7937273" cy="4296029"/>
+          </a:xfrm>
+          <a:prstGeom prst="rect">
+            <a:avLst/>
+          </a:prstGeom>
+        </p:spPr>
+      </p:pic>
+    </p:spTree>
+    <p:extLst>
+      <p:ext uri="{BB962C8B-B14F-4D97-AF65-F5344CB8AC3E}">
+        <p14:creationId xmlns:p14="http://schemas.microsoft.com/office/powerpoint/2010/main" val="3169417234"/>
+      </p:ext>
+    </p:extLst>
+  </p:cSld>
+  <p:clrMapOvr>
+    <a:masterClrMapping/>
+  </p:clrMapOvr>
+</p:sld>
+</file>
+
+<file path=ppt/slides/slide21.xml><?xml version="1.0" encoding="utf-8"?>
 <p:sld xmlns:a="http://schemas.openxmlformats.org/drawingml/2006/main" xmlns:r="http://schemas.openxmlformats.org/officeDocument/2006/relationships" xmlns:p="http://schemas.openxmlformats.org/presentationml/2006/main">
   <p:cSld>
     <p:spTree>
@@ -14456,7 +14595,178 @@
 </p:sld>
 </file>
 
-<file path=ppt/slides/slide21.xml><?xml version="1.0" encoding="utf-8"?>
+<file path=ppt/slides/slide22.xml><?xml version="1.0" encoding="utf-8"?>
+<p:sld xmlns:a="http://schemas.openxmlformats.org/drawingml/2006/main" xmlns:r="http://schemas.openxmlformats.org/officeDocument/2006/relationships" xmlns:p="http://schemas.openxmlformats.org/presentationml/2006/main">
+  <p:cSld>
+    <p:spTree>
+      <p:nvGrpSpPr>
+        <p:cNvPr id="1" name=""/>
+        <p:cNvGrpSpPr/>
+        <p:nvPr/>
+      </p:nvGrpSpPr>
+      <p:grpSpPr>
+        <a:xfrm>
+          <a:off x="0" y="0"/>
+          <a:ext cx="0" cy="0"/>
+          <a:chOff x="0" y="0"/>
+          <a:chExt cx="0" cy="0"/>
+        </a:xfrm>
+      </p:grpSpPr>
+      <p:sp>
+        <p:nvSpPr>
+          <p:cNvPr id="2" name="Title 1">
+            <a:extLst>
+              <a:ext uri="{FF2B5EF4-FFF2-40B4-BE49-F238E27FC236}">
+                <a16:creationId xmlns:a16="http://schemas.microsoft.com/office/drawing/2014/main" id="{0087C74A-392F-4F6F-BB5A-60D67134E339}"/>
+              </a:ext>
+            </a:extLst>
+          </p:cNvPr>
+          <p:cNvSpPr>
+            <a:spLocks noGrp="1"/>
+          </p:cNvSpPr>
+          <p:nvPr>
+            <p:ph type="title"/>
+          </p:nvPr>
+        </p:nvSpPr>
+        <p:spPr/>
+        <p:txBody>
+          <a:bodyPr/>
+          <a:lstStyle/>
+          <a:p>
+            <a:r>
+              <a:rPr lang="ru-RU" cap="none" dirty="0" err="1">
+                <a:effectLst>
+                  <a:outerShdw blurRad="38100" dist="38100" dir="2700000" algn="tl">
+                    <a:srgbClr val="000000">
+                      <a:alpha val="43137"/>
+                    </a:srgbClr>
+                  </a:outerShdw>
+                </a:effectLst>
+              </a:rPr>
+              <a:t>Автодополнение</a:t>
+            </a:r>
+            <a:r>
+              <a:rPr lang="ru-RU" cap="none" dirty="0">
+                <a:effectLst>
+                  <a:outerShdw blurRad="38100" dist="38100" dir="2700000" algn="tl">
+                    <a:srgbClr val="000000">
+                      <a:alpha val="43137"/>
+                    </a:srgbClr>
+                  </a:outerShdw>
+                </a:effectLst>
+              </a:rPr>
+              <a:t> (</a:t>
+            </a:r>
+            <a:r>
+              <a:rPr lang="en-US" cap="none" dirty="0">
+                <a:effectLst>
+                  <a:outerShdw blurRad="38100" dist="38100" dir="2700000" algn="tl">
+                    <a:srgbClr val="000000">
+                      <a:alpha val="43137"/>
+                    </a:srgbClr>
+                  </a:outerShdw>
+                </a:effectLst>
+              </a:rPr>
+              <a:t>Fill-in-the-middle, FIM</a:t>
+            </a:r>
+            <a:r>
+              <a:rPr lang="ru-RU" cap="none" dirty="0">
+                <a:effectLst>
+                  <a:outerShdw blurRad="38100" dist="38100" dir="2700000" algn="tl">
+                    <a:srgbClr val="000000">
+                      <a:alpha val="43137"/>
+                    </a:srgbClr>
+                  </a:outerShdw>
+                </a:effectLst>
+              </a:rPr>
+              <a:t>)</a:t>
+            </a:r>
+            <a:endParaRPr lang="ru-RU" dirty="0"/>
+          </a:p>
+        </p:txBody>
+      </p:sp>
+      <p:sp>
+        <p:nvSpPr>
+          <p:cNvPr id="3" name="Content Placeholder 2">
+            <a:extLst>
+              <a:ext uri="{FF2B5EF4-FFF2-40B4-BE49-F238E27FC236}">
+                <a16:creationId xmlns:a16="http://schemas.microsoft.com/office/drawing/2014/main" id="{A3317DDE-366B-4B7C-935C-BDA649442798}"/>
+              </a:ext>
+            </a:extLst>
+          </p:cNvPr>
+          <p:cNvSpPr>
+            <a:spLocks noGrp="1"/>
+          </p:cNvSpPr>
+          <p:nvPr>
+            <p:ph idx="1"/>
+          </p:nvPr>
+        </p:nvSpPr>
+        <p:spPr/>
+        <p:txBody>
+          <a:bodyPr/>
+          <a:lstStyle/>
+          <a:p>
+            <a:r>
+              <a:rPr lang="ru-RU" dirty="0"/>
+              <a:t>Генерация текста в середине заданного контекста, учитывая его префикс и суффикс</a:t>
+            </a:r>
+          </a:p>
+        </p:txBody>
+      </p:sp>
+      <p:pic>
+        <p:nvPicPr>
+          <p:cNvPr id="4" name="Picture 3">
+            <a:extLst>
+              <a:ext uri="{FF2B5EF4-FFF2-40B4-BE49-F238E27FC236}">
+                <a16:creationId xmlns:a16="http://schemas.microsoft.com/office/drawing/2014/main" id="{F0F146DA-B91C-4556-95F6-F4B83940B01F}"/>
+              </a:ext>
+            </a:extLst>
+          </p:cNvPr>
+          <p:cNvPicPr>
+            <a:picLocks noChangeAspect="1"/>
+          </p:cNvPicPr>
+          <p:nvPr/>
+        </p:nvPicPr>
+        <p:blipFill>
+          <a:blip r:embed="rId2"/>
+          <a:stretch>
+            <a:fillRect/>
+          </a:stretch>
+        </p:blipFill>
+        <p:spPr>
+          <a:xfrm>
+            <a:off x="4150932" y="2828513"/>
+            <a:ext cx="6504367" cy="3542658"/>
+          </a:xfrm>
+          <a:prstGeom prst="rect">
+            <a:avLst/>
+          </a:prstGeom>
+          <a:ln>
+            <a:noFill/>
+          </a:ln>
+          <a:effectLst>
+            <a:outerShdw blurRad="190500" algn="tl" rotWithShape="0">
+              <a:srgbClr val="000000">
+                <a:alpha val="70000"/>
+              </a:srgbClr>
+            </a:outerShdw>
+          </a:effectLst>
+        </p:spPr>
+      </p:pic>
+    </p:spTree>
+    <p:extLst>
+      <p:ext uri="{BB962C8B-B14F-4D97-AF65-F5344CB8AC3E}">
+        <p14:creationId xmlns:p14="http://schemas.microsoft.com/office/powerpoint/2010/main" val="392660440"/>
+      </p:ext>
+    </p:extLst>
+  </p:cSld>
+  <p:clrMapOvr>
+    <a:masterClrMapping/>
+  </p:clrMapOvr>
+</p:sld>
+</file>
+
+<file path=ppt/slides/slide23.xml><?xml version="1.0" encoding="utf-8"?>
 <p:sld xmlns:a="http://schemas.openxmlformats.org/drawingml/2006/main" xmlns:r="http://schemas.openxmlformats.org/officeDocument/2006/relationships" xmlns:p="http://schemas.openxmlformats.org/presentationml/2006/main">
   <p:cSld>
     <p:spTree>
@@ -14494,7 +14804,536 @@
           <a:bodyPr/>
           <a:lstStyle/>
           <a:p>
-            <a:endParaRPr lang="ru-RU" dirty="0"/>
+            <a:r>
+              <a:rPr lang="en-US" cap="none" dirty="0">
+                <a:effectLst>
+                  <a:outerShdw blurRad="38100" dist="38100" dir="2700000" algn="tl">
+                    <a:srgbClr val="000000">
+                      <a:alpha val="43137"/>
+                    </a:srgbClr>
+                  </a:outerShdw>
+                </a:effectLst>
+              </a:rPr>
+              <a:t>Windsurf</a:t>
+            </a:r>
+            <a:endParaRPr lang="ru-RU" dirty="0">
+              <a:effectLst>
+                <a:outerShdw blurRad="38100" dist="38100" dir="2700000" algn="tl">
+                  <a:srgbClr val="000000">
+                    <a:alpha val="43137"/>
+                  </a:srgbClr>
+                </a:outerShdw>
+              </a:effectLst>
+            </a:endParaRPr>
+          </a:p>
+        </p:txBody>
+      </p:sp>
+      <p:pic>
+        <p:nvPicPr>
+          <p:cNvPr id="4" name="Picture 3">
+            <a:extLst>
+              <a:ext uri="{FF2B5EF4-FFF2-40B4-BE49-F238E27FC236}">
+                <a16:creationId xmlns:a16="http://schemas.microsoft.com/office/drawing/2014/main" id="{13FF9EDF-9DFE-43E3-9E3C-CC3234FEE471}"/>
+              </a:ext>
+            </a:extLst>
+          </p:cNvPr>
+          <p:cNvPicPr>
+            <a:picLocks noChangeAspect="1"/>
+          </p:cNvPicPr>
+          <p:nvPr/>
+        </p:nvPicPr>
+        <p:blipFill>
+          <a:blip r:embed="rId2"/>
+          <a:stretch>
+            <a:fillRect/>
+          </a:stretch>
+        </p:blipFill>
+        <p:spPr>
+          <a:xfrm>
+            <a:off x="1141413" y="1943100"/>
+            <a:ext cx="9972047" cy="4296382"/>
+          </a:xfrm>
+          <a:prstGeom prst="rect">
+            <a:avLst/>
+          </a:prstGeom>
+        </p:spPr>
+      </p:pic>
+    </p:spTree>
+    <p:extLst>
+      <p:ext uri="{BB962C8B-B14F-4D97-AF65-F5344CB8AC3E}">
+        <p14:creationId xmlns:p14="http://schemas.microsoft.com/office/powerpoint/2010/main" val="495213820"/>
+      </p:ext>
+    </p:extLst>
+  </p:cSld>
+  <p:clrMapOvr>
+    <a:masterClrMapping/>
+  </p:clrMapOvr>
+</p:sld>
+</file>
+
+<file path=ppt/slides/slide24.xml><?xml version="1.0" encoding="utf-8"?>
+<p:sld xmlns:a="http://schemas.openxmlformats.org/drawingml/2006/main" xmlns:r="http://schemas.openxmlformats.org/officeDocument/2006/relationships" xmlns:p="http://schemas.openxmlformats.org/presentationml/2006/main">
+  <p:cSld>
+    <p:spTree>
+      <p:nvGrpSpPr>
+        <p:cNvPr id="1" name=""/>
+        <p:cNvGrpSpPr/>
+        <p:nvPr/>
+      </p:nvGrpSpPr>
+      <p:grpSpPr>
+        <a:xfrm>
+          <a:off x="0" y="0"/>
+          <a:ext cx="0" cy="0"/>
+          <a:chOff x="0" y="0"/>
+          <a:chExt cx="0" cy="0"/>
+        </a:xfrm>
+      </p:grpSpPr>
+      <p:pic>
+        <p:nvPicPr>
+          <p:cNvPr id="3" name="Picture 2">
+            <a:extLst>
+              <a:ext uri="{FF2B5EF4-FFF2-40B4-BE49-F238E27FC236}">
+                <a16:creationId xmlns:a16="http://schemas.microsoft.com/office/drawing/2014/main" id="{FBABEA2B-E940-41B1-B200-9EDCCFD82278}"/>
+              </a:ext>
+            </a:extLst>
+          </p:cNvPr>
+          <p:cNvPicPr>
+            <a:picLocks noChangeAspect="1"/>
+          </p:cNvPicPr>
+          <p:nvPr/>
+        </p:nvPicPr>
+        <p:blipFill rotWithShape="1">
+          <a:blip r:embed="rId2"/>
+          <a:srcRect l="1088"/>
+          <a:stretch/>
+        </p:blipFill>
+        <p:spPr>
+          <a:xfrm>
+            <a:off x="2777172" y="1739900"/>
+            <a:ext cx="6177165" cy="4824714"/>
+          </a:xfrm>
+          <a:prstGeom prst="rect">
+            <a:avLst/>
+          </a:prstGeom>
+          <a:ln>
+            <a:noFill/>
+          </a:ln>
+          <a:effectLst>
+            <a:outerShdw blurRad="190500" algn="tl" rotWithShape="0">
+              <a:srgbClr val="000000">
+                <a:alpha val="70000"/>
+              </a:srgbClr>
+            </a:outerShdw>
+          </a:effectLst>
+        </p:spPr>
+      </p:pic>
+      <p:sp>
+        <p:nvSpPr>
+          <p:cNvPr id="5" name="Title 1">
+            <a:extLst>
+              <a:ext uri="{FF2B5EF4-FFF2-40B4-BE49-F238E27FC236}">
+                <a16:creationId xmlns:a16="http://schemas.microsoft.com/office/drawing/2014/main" id="{1A96B6B8-C081-499D-B5CE-3A29062B8C0D}"/>
+              </a:ext>
+            </a:extLst>
+          </p:cNvPr>
+          <p:cNvSpPr>
+            <a:spLocks noGrp="1"/>
+          </p:cNvSpPr>
+          <p:nvPr>
+            <p:ph type="title"/>
+          </p:nvPr>
+        </p:nvSpPr>
+        <p:spPr>
+          <a:xfrm>
+            <a:off x="1141413" y="618518"/>
+            <a:ext cx="9905998" cy="1478570"/>
+          </a:xfrm>
+        </p:spPr>
+        <p:txBody>
+          <a:bodyPr/>
+          <a:lstStyle/>
+          <a:p>
+            <a:r>
+              <a:rPr lang="en-US" cap="none" dirty="0" err="1">
+                <a:effectLst>
+                  <a:outerShdw blurRad="38100" dist="38100" dir="2700000" algn="tl">
+                    <a:srgbClr val="000000">
+                      <a:alpha val="43137"/>
+                    </a:srgbClr>
+                  </a:outerShdw>
+                </a:effectLst>
+              </a:rPr>
+              <a:t>Continue.dev</a:t>
+            </a:r>
+            <a:r>
+              <a:rPr lang="en-US" cap="none" dirty="0">
+                <a:effectLst>
+                  <a:outerShdw blurRad="38100" dist="38100" dir="2700000" algn="tl">
+                    <a:srgbClr val="000000">
+                      <a:alpha val="43137"/>
+                    </a:srgbClr>
+                  </a:outerShdw>
+                </a:effectLst>
+              </a:rPr>
+              <a:t> + </a:t>
+            </a:r>
+            <a:r>
+              <a:rPr lang="en-US" cap="none" dirty="0" err="1">
+                <a:effectLst>
+                  <a:outerShdw blurRad="38100" dist="38100" dir="2700000" algn="tl">
+                    <a:srgbClr val="000000">
+                      <a:alpha val="43137"/>
+                    </a:srgbClr>
+                  </a:outerShdw>
+                </a:effectLst>
+              </a:rPr>
+              <a:t>codestral</a:t>
+            </a:r>
+            <a:endParaRPr lang="ru-RU" cap="none" dirty="0">
+              <a:effectLst>
+                <a:outerShdw blurRad="38100" dist="38100" dir="2700000" algn="tl">
+                  <a:srgbClr val="000000">
+                    <a:alpha val="43137"/>
+                  </a:srgbClr>
+                </a:outerShdw>
+              </a:effectLst>
+            </a:endParaRPr>
+          </a:p>
+        </p:txBody>
+      </p:sp>
+    </p:spTree>
+    <p:extLst>
+      <p:ext uri="{BB962C8B-B14F-4D97-AF65-F5344CB8AC3E}">
+        <p14:creationId xmlns:p14="http://schemas.microsoft.com/office/powerpoint/2010/main" val="1467093375"/>
+      </p:ext>
+    </p:extLst>
+  </p:cSld>
+  <p:clrMapOvr>
+    <a:masterClrMapping/>
+  </p:clrMapOvr>
+</p:sld>
+</file>
+
+<file path=ppt/slides/slide25.xml><?xml version="1.0" encoding="utf-8"?>
+<p:sld xmlns:a="http://schemas.openxmlformats.org/drawingml/2006/main" xmlns:r="http://schemas.openxmlformats.org/officeDocument/2006/relationships" xmlns:p="http://schemas.openxmlformats.org/presentationml/2006/main">
+  <p:cSld>
+    <p:spTree>
+      <p:nvGrpSpPr>
+        <p:cNvPr id="1" name=""/>
+        <p:cNvGrpSpPr/>
+        <p:nvPr/>
+      </p:nvGrpSpPr>
+      <p:grpSpPr>
+        <a:xfrm>
+          <a:off x="0" y="0"/>
+          <a:ext cx="0" cy="0"/>
+          <a:chOff x="0" y="0"/>
+          <a:chExt cx="0" cy="0"/>
+        </a:xfrm>
+      </p:grpSpPr>
+      <p:sp>
+        <p:nvSpPr>
+          <p:cNvPr id="5" name="Title 1">
+            <a:extLst>
+              <a:ext uri="{FF2B5EF4-FFF2-40B4-BE49-F238E27FC236}">
+                <a16:creationId xmlns:a16="http://schemas.microsoft.com/office/drawing/2014/main" id="{1A96B6B8-C081-499D-B5CE-3A29062B8C0D}"/>
+              </a:ext>
+            </a:extLst>
+          </p:cNvPr>
+          <p:cNvSpPr>
+            <a:spLocks noGrp="1"/>
+          </p:cNvSpPr>
+          <p:nvPr>
+            <p:ph type="title"/>
+          </p:nvPr>
+        </p:nvSpPr>
+        <p:spPr>
+          <a:xfrm>
+            <a:off x="1141413" y="618518"/>
+            <a:ext cx="9905998" cy="1478570"/>
+          </a:xfrm>
+        </p:spPr>
+        <p:txBody>
+          <a:bodyPr/>
+          <a:lstStyle/>
+          <a:p>
+            <a:r>
+              <a:rPr lang="ru-RU" cap="none" dirty="0">
+                <a:effectLst>
+                  <a:outerShdw blurRad="38100" dist="38100" dir="2700000" algn="tl">
+                    <a:srgbClr val="000000">
+                      <a:alpha val="43137"/>
+                    </a:srgbClr>
+                  </a:outerShdw>
+                </a:effectLst>
+              </a:rPr>
+              <a:t>Контекст</a:t>
+            </a:r>
+          </a:p>
+        </p:txBody>
+      </p:sp>
+      <p:pic>
+        <p:nvPicPr>
+          <p:cNvPr id="2" name="Picture 1">
+            <a:extLst>
+              <a:ext uri="{FF2B5EF4-FFF2-40B4-BE49-F238E27FC236}">
+                <a16:creationId xmlns:a16="http://schemas.microsoft.com/office/drawing/2014/main" id="{87764D8B-4E1B-4A59-962F-62C3A1A10DA3}"/>
+              </a:ext>
+            </a:extLst>
+          </p:cNvPr>
+          <p:cNvPicPr>
+            <a:picLocks noChangeAspect="1"/>
+          </p:cNvPicPr>
+          <p:nvPr/>
+        </p:nvPicPr>
+        <p:blipFill rotWithShape="1">
+          <a:blip r:embed="rId2"/>
+          <a:srcRect r="46810"/>
+          <a:stretch/>
+        </p:blipFill>
+        <p:spPr>
+          <a:xfrm>
+            <a:off x="6094412" y="836501"/>
+            <a:ext cx="5454391" cy="4804382"/>
+          </a:xfrm>
+          <a:prstGeom prst="rect">
+            <a:avLst/>
+          </a:prstGeom>
+          <a:ln>
+            <a:noFill/>
+          </a:ln>
+          <a:effectLst>
+            <a:outerShdw blurRad="190500" algn="tl" rotWithShape="0">
+              <a:srgbClr val="000000">
+                <a:alpha val="70000"/>
+              </a:srgbClr>
+            </a:outerShdw>
+          </a:effectLst>
+        </p:spPr>
+      </p:pic>
+      <p:pic>
+        <p:nvPicPr>
+          <p:cNvPr id="4" name="Picture 3">
+            <a:extLst>
+              <a:ext uri="{FF2B5EF4-FFF2-40B4-BE49-F238E27FC236}">
+                <a16:creationId xmlns:a16="http://schemas.microsoft.com/office/drawing/2014/main" id="{DC848B3E-905B-4F7B-8280-A15B0C023C74}"/>
+              </a:ext>
+            </a:extLst>
+          </p:cNvPr>
+          <p:cNvPicPr>
+            <a:picLocks noChangeAspect="1"/>
+          </p:cNvPicPr>
+          <p:nvPr/>
+        </p:nvPicPr>
+        <p:blipFill rotWithShape="1">
+          <a:blip r:embed="rId3"/>
+          <a:srcRect r="41840"/>
+          <a:stretch/>
+        </p:blipFill>
+        <p:spPr>
+          <a:xfrm>
+            <a:off x="548606" y="2097088"/>
+            <a:ext cx="5328848" cy="3543795"/>
+          </a:xfrm>
+          <a:prstGeom prst="rect">
+            <a:avLst/>
+          </a:prstGeom>
+          <a:ln>
+            <a:noFill/>
+          </a:ln>
+          <a:effectLst>
+            <a:outerShdw blurRad="190500" algn="tl" rotWithShape="0">
+              <a:srgbClr val="000000">
+                <a:alpha val="70000"/>
+              </a:srgbClr>
+            </a:outerShdw>
+          </a:effectLst>
+        </p:spPr>
+      </p:pic>
+    </p:spTree>
+    <p:extLst>
+      <p:ext uri="{BB962C8B-B14F-4D97-AF65-F5344CB8AC3E}">
+        <p14:creationId xmlns:p14="http://schemas.microsoft.com/office/powerpoint/2010/main" val="1780961386"/>
+      </p:ext>
+    </p:extLst>
+  </p:cSld>
+  <p:clrMapOvr>
+    <a:masterClrMapping/>
+  </p:clrMapOvr>
+</p:sld>
+</file>
+
+<file path=ppt/slides/slide26.xml><?xml version="1.0" encoding="utf-8"?>
+<p:sld xmlns:a="http://schemas.openxmlformats.org/drawingml/2006/main" xmlns:r="http://schemas.openxmlformats.org/officeDocument/2006/relationships" xmlns:p="http://schemas.openxmlformats.org/presentationml/2006/main">
+  <p:cSld>
+    <p:spTree>
+      <p:nvGrpSpPr>
+        <p:cNvPr id="1" name=""/>
+        <p:cNvGrpSpPr/>
+        <p:nvPr/>
+      </p:nvGrpSpPr>
+      <p:grpSpPr>
+        <a:xfrm>
+          <a:off x="0" y="0"/>
+          <a:ext cx="0" cy="0"/>
+          <a:chOff x="0" y="0"/>
+          <a:chExt cx="0" cy="0"/>
+        </a:xfrm>
+      </p:grpSpPr>
+      <p:pic>
+        <p:nvPicPr>
+          <p:cNvPr id="4" name="Picture 3">
+            <a:extLst>
+              <a:ext uri="{FF2B5EF4-FFF2-40B4-BE49-F238E27FC236}">
+                <a16:creationId xmlns:a16="http://schemas.microsoft.com/office/drawing/2014/main" id="{9AD2B3B7-B7FE-4747-B6BF-0C50DABC4FFB}"/>
+              </a:ext>
+            </a:extLst>
+          </p:cNvPr>
+          <p:cNvPicPr>
+            <a:picLocks noChangeAspect="1"/>
+          </p:cNvPicPr>
+          <p:nvPr/>
+        </p:nvPicPr>
+        <p:blipFill rotWithShape="1">
+          <a:blip r:embed="rId2"/>
+          <a:srcRect b="35925"/>
+          <a:stretch/>
+        </p:blipFill>
+        <p:spPr>
+          <a:xfrm>
+            <a:off x="1860693" y="1754270"/>
+            <a:ext cx="8467438" cy="4834560"/>
+          </a:xfrm>
+          <a:prstGeom prst="rect">
+            <a:avLst/>
+          </a:prstGeom>
+        </p:spPr>
+      </p:pic>
+      <p:sp>
+        <p:nvSpPr>
+          <p:cNvPr id="5" name="Title 1">
+            <a:extLst>
+              <a:ext uri="{FF2B5EF4-FFF2-40B4-BE49-F238E27FC236}">
+                <a16:creationId xmlns:a16="http://schemas.microsoft.com/office/drawing/2014/main" id="{AA1C2336-1EFD-4F1B-82EF-D7A75D71FABD}"/>
+              </a:ext>
+            </a:extLst>
+          </p:cNvPr>
+          <p:cNvSpPr>
+            <a:spLocks noGrp="1"/>
+          </p:cNvSpPr>
+          <p:nvPr>
+            <p:ph type="title"/>
+          </p:nvPr>
+        </p:nvSpPr>
+        <p:spPr>
+          <a:xfrm>
+            <a:off x="1141413" y="618518"/>
+            <a:ext cx="9905998" cy="1478570"/>
+          </a:xfrm>
+        </p:spPr>
+        <p:txBody>
+          <a:bodyPr/>
+          <a:lstStyle/>
+          <a:p>
+            <a:r>
+              <a:rPr lang="ru-RU" cap="none" dirty="0">
+                <a:effectLst>
+                  <a:outerShdw blurRad="38100" dist="38100" dir="2700000" algn="tl">
+                    <a:srgbClr val="000000">
+                      <a:alpha val="43137"/>
+                    </a:srgbClr>
+                  </a:outerShdw>
+                </a:effectLst>
+              </a:rPr>
+              <a:t>Галлюцинации</a:t>
+            </a:r>
+          </a:p>
+        </p:txBody>
+      </p:sp>
+    </p:spTree>
+    <p:extLst>
+      <p:ext uri="{BB962C8B-B14F-4D97-AF65-F5344CB8AC3E}">
+        <p14:creationId xmlns:p14="http://schemas.microsoft.com/office/powerpoint/2010/main" val="3774815047"/>
+      </p:ext>
+    </p:extLst>
+  </p:cSld>
+  <p:clrMapOvr>
+    <a:masterClrMapping/>
+  </p:clrMapOvr>
+</p:sld>
+</file>
+
+<file path=ppt/slides/slide27.xml><?xml version="1.0" encoding="utf-8"?>
+<p:sld xmlns:a="http://schemas.openxmlformats.org/drawingml/2006/main" xmlns:r="http://schemas.openxmlformats.org/officeDocument/2006/relationships" xmlns:p="http://schemas.openxmlformats.org/presentationml/2006/main">
+  <p:cSld>
+    <p:spTree>
+      <p:nvGrpSpPr>
+        <p:cNvPr id="1" name=""/>
+        <p:cNvGrpSpPr/>
+        <p:nvPr/>
+      </p:nvGrpSpPr>
+      <p:grpSpPr>
+        <a:xfrm>
+          <a:off x="0" y="0"/>
+          <a:ext cx="0" cy="0"/>
+          <a:chOff x="0" y="0"/>
+          <a:chExt cx="0" cy="0"/>
+        </a:xfrm>
+      </p:grpSpPr>
+      <p:sp>
+        <p:nvSpPr>
+          <p:cNvPr id="2" name="Title 1">
+            <a:extLst>
+              <a:ext uri="{FF2B5EF4-FFF2-40B4-BE49-F238E27FC236}">
+                <a16:creationId xmlns:a16="http://schemas.microsoft.com/office/drawing/2014/main" id="{AFE70478-6EDE-4E48-88A7-ED84CCA39197}"/>
+              </a:ext>
+            </a:extLst>
+          </p:cNvPr>
+          <p:cNvSpPr>
+            <a:spLocks noGrp="1"/>
+          </p:cNvSpPr>
+          <p:nvPr>
+            <p:ph type="title"/>
+          </p:nvPr>
+        </p:nvSpPr>
+        <p:spPr/>
+        <p:txBody>
+          <a:bodyPr/>
+          <a:lstStyle/>
+          <a:p>
+            <a:r>
+              <a:rPr lang="ru-RU" cap="none" dirty="0">
+                <a:effectLst>
+                  <a:outerShdw blurRad="38100" dist="38100" dir="2700000" algn="tl">
+                    <a:srgbClr val="000000">
+                      <a:alpha val="43137"/>
+                    </a:srgbClr>
+                  </a:outerShdw>
+                </a:effectLst>
+              </a:rPr>
+              <a:t>Инструменты </a:t>
+            </a:r>
+            <a:r>
+              <a:rPr lang="en-US" cap="none" dirty="0">
+                <a:effectLst>
+                  <a:outerShdw blurRad="38100" dist="38100" dir="2700000" algn="tl">
+                    <a:srgbClr val="000000">
+                      <a:alpha val="43137"/>
+                    </a:srgbClr>
+                  </a:outerShdw>
+                </a:effectLst>
+              </a:rPr>
+              <a:t>FIM</a:t>
+            </a:r>
+            <a:endParaRPr lang="ru-RU" cap="none" dirty="0">
+              <a:effectLst>
+                <a:outerShdw blurRad="38100" dist="38100" dir="2700000" algn="tl">
+                  <a:srgbClr val="000000">
+                    <a:alpha val="43137"/>
+                  </a:srgbClr>
+                </a:outerShdw>
+              </a:effectLst>
+            </a:endParaRPr>
           </a:p>
         </p:txBody>
       </p:sp>
@@ -14503,7 +15342,7 @@
           <p:cNvPr id="3" name="Content Placeholder 2">
             <a:extLst>
               <a:ext uri="{FF2B5EF4-FFF2-40B4-BE49-F238E27FC236}">
-                <a16:creationId xmlns:a16="http://schemas.microsoft.com/office/drawing/2014/main" id="{DF7C3F2F-6FDA-463F-AA1E-8B88348F08B0}"/>
+                <a16:creationId xmlns:a16="http://schemas.microsoft.com/office/drawing/2014/main" id="{389C4390-6FB2-4FB0-86B3-911608214B64}"/>
               </a:ext>
             </a:extLst>
           </p:cNvPr>
@@ -14519,14 +15358,430 @@
           <a:bodyPr/>
           <a:lstStyle/>
           <a:p>
-            <a:endParaRPr lang="ru-RU"/>
+            <a:r>
+              <a:rPr lang="en-US" dirty="0" err="1"/>
+              <a:t>SuperMaven</a:t>
+            </a:r>
+            <a:endParaRPr lang="en-US" dirty="0"/>
+          </a:p>
+          <a:p>
+            <a:r>
+              <a:rPr lang="en-US" dirty="0"/>
+              <a:t>GitHub Copilot</a:t>
+            </a:r>
+          </a:p>
+          <a:p>
+            <a:r>
+              <a:rPr lang="en-US" dirty="0" err="1"/>
+              <a:t>Continue.dev</a:t>
+            </a:r>
+            <a:r>
+              <a:rPr lang="en-US" dirty="0"/>
+              <a:t> – </a:t>
+            </a:r>
+            <a:r>
+              <a:rPr lang="ru-RU" dirty="0"/>
+              <a:t>расширение для </a:t>
+            </a:r>
+            <a:r>
+              <a:rPr lang="en-US" dirty="0" err="1"/>
+              <a:t>VSCode</a:t>
+            </a:r>
+            <a:r>
+              <a:rPr lang="en-US" dirty="0"/>
+              <a:t> </a:t>
+            </a:r>
+            <a:r>
+              <a:rPr lang="ru-RU" dirty="0"/>
+              <a:t>и </a:t>
+            </a:r>
+            <a:r>
+              <a:rPr lang="en-US" dirty="0"/>
+              <a:t>JetBrains</a:t>
+            </a:r>
+          </a:p>
+          <a:p>
+            <a:pPr marL="0" indent="0">
+              <a:buNone/>
+            </a:pPr>
+            <a:r>
+              <a:rPr lang="ru-RU" dirty="0"/>
+              <a:t>Также встроены в редакторы</a:t>
+            </a:r>
+          </a:p>
+          <a:p>
+            <a:r>
+              <a:rPr lang="en-US" dirty="0"/>
+              <a:t>Cursor</a:t>
+            </a:r>
+          </a:p>
+          <a:p>
+            <a:r>
+              <a:rPr lang="en-US" dirty="0"/>
+              <a:t>Windsurf</a:t>
+            </a:r>
           </a:p>
         </p:txBody>
       </p:sp>
     </p:spTree>
     <p:extLst>
       <p:ext uri="{BB962C8B-B14F-4D97-AF65-F5344CB8AC3E}">
-        <p14:creationId xmlns:p14="http://schemas.microsoft.com/office/powerpoint/2010/main" val="318206910"/>
+        <p14:creationId xmlns:p14="http://schemas.microsoft.com/office/powerpoint/2010/main" val="3693075369"/>
+      </p:ext>
+    </p:extLst>
+  </p:cSld>
+  <p:clrMapOvr>
+    <a:masterClrMapping/>
+  </p:clrMapOvr>
+</p:sld>
+</file>
+
+<file path=ppt/slides/slide28.xml><?xml version="1.0" encoding="utf-8"?>
+<p:sld xmlns:a="http://schemas.openxmlformats.org/drawingml/2006/main" xmlns:r="http://schemas.openxmlformats.org/officeDocument/2006/relationships" xmlns:p="http://schemas.openxmlformats.org/presentationml/2006/main">
+  <p:cSld>
+    <p:spTree>
+      <p:nvGrpSpPr>
+        <p:cNvPr id="1" name=""/>
+        <p:cNvGrpSpPr/>
+        <p:nvPr/>
+      </p:nvGrpSpPr>
+      <p:grpSpPr>
+        <a:xfrm>
+          <a:off x="0" y="0"/>
+          <a:ext cx="0" cy="0"/>
+          <a:chOff x="0" y="0"/>
+          <a:chExt cx="0" cy="0"/>
+        </a:xfrm>
+      </p:grpSpPr>
+      <p:sp>
+        <p:nvSpPr>
+          <p:cNvPr id="2" name="Title 1">
+            <a:extLst>
+              <a:ext uri="{FF2B5EF4-FFF2-40B4-BE49-F238E27FC236}">
+                <a16:creationId xmlns:a16="http://schemas.microsoft.com/office/drawing/2014/main" id="{3F5527D8-122F-4579-BA32-F4F09885BBD8}"/>
+              </a:ext>
+            </a:extLst>
+          </p:cNvPr>
+          <p:cNvSpPr>
+            <a:spLocks noGrp="1"/>
+          </p:cNvSpPr>
+          <p:nvPr>
+            <p:ph type="title"/>
+          </p:nvPr>
+        </p:nvSpPr>
+        <p:spPr/>
+        <p:txBody>
+          <a:bodyPr/>
+          <a:lstStyle/>
+          <a:p>
+            <a:r>
+              <a:rPr lang="ru-RU" cap="none" dirty="0">
+                <a:effectLst>
+                  <a:outerShdw blurRad="38100" dist="38100" dir="2700000" algn="tl">
+                    <a:srgbClr val="000000">
+                      <a:alpha val="43137"/>
+                    </a:srgbClr>
+                  </a:outerShdw>
+                </a:effectLst>
+              </a:rPr>
+              <a:t>Агенты</a:t>
+            </a:r>
+            <a:endParaRPr lang="ru-RU" dirty="0">
+              <a:effectLst>
+                <a:outerShdw blurRad="38100" dist="38100" dir="2700000" algn="tl">
+                  <a:srgbClr val="000000">
+                    <a:alpha val="43137"/>
+                  </a:srgbClr>
+                </a:outerShdw>
+              </a:effectLst>
+            </a:endParaRPr>
+          </a:p>
+        </p:txBody>
+      </p:sp>
+      <p:sp>
+        <p:nvSpPr>
+          <p:cNvPr id="3" name="Content Placeholder 2">
+            <a:extLst>
+              <a:ext uri="{FF2B5EF4-FFF2-40B4-BE49-F238E27FC236}">
+                <a16:creationId xmlns:a16="http://schemas.microsoft.com/office/drawing/2014/main" id="{06F4F627-0C1E-434C-BB74-9C44DBD7E20A}"/>
+              </a:ext>
+            </a:extLst>
+          </p:cNvPr>
+          <p:cNvSpPr>
+            <a:spLocks noGrp="1"/>
+          </p:cNvSpPr>
+          <p:nvPr>
+            <p:ph idx="1"/>
+          </p:nvPr>
+        </p:nvSpPr>
+        <p:spPr/>
+        <p:txBody>
+          <a:bodyPr/>
+          <a:lstStyle/>
+          <a:p>
+            <a:pPr marL="0" indent="0">
+              <a:buNone/>
+            </a:pPr>
+            <a:r>
+              <a:rPr lang="ru-RU" dirty="0">
+                <a:effectLst>
+                  <a:outerShdw blurRad="38100" dist="38100" dir="2700000" algn="tl">
+                    <a:srgbClr val="000000">
+                      <a:alpha val="43137"/>
+                    </a:srgbClr>
+                  </a:outerShdw>
+                </a:effectLst>
+              </a:rPr>
+              <a:t>Агент – это система, получающая данные о состоянии процессов через внешние инструменты и способная использовать внешние инструменты для управления этими процессами.</a:t>
+            </a:r>
+          </a:p>
+        </p:txBody>
+      </p:sp>
+    </p:spTree>
+    <p:extLst>
+      <p:ext uri="{BB962C8B-B14F-4D97-AF65-F5344CB8AC3E}">
+        <p14:creationId xmlns:p14="http://schemas.microsoft.com/office/powerpoint/2010/main" val="3300644715"/>
+      </p:ext>
+    </p:extLst>
+  </p:cSld>
+  <p:clrMapOvr>
+    <a:masterClrMapping/>
+  </p:clrMapOvr>
+</p:sld>
+</file>
+
+<file path=ppt/slides/slide29.xml><?xml version="1.0" encoding="utf-8"?>
+<p:sld xmlns:a="http://schemas.openxmlformats.org/drawingml/2006/main" xmlns:r="http://schemas.openxmlformats.org/officeDocument/2006/relationships" xmlns:p="http://schemas.openxmlformats.org/presentationml/2006/main">
+  <p:cSld>
+    <p:spTree>
+      <p:nvGrpSpPr>
+        <p:cNvPr id="1" name=""/>
+        <p:cNvGrpSpPr/>
+        <p:nvPr/>
+      </p:nvGrpSpPr>
+      <p:grpSpPr>
+        <a:xfrm>
+          <a:off x="0" y="0"/>
+          <a:ext cx="0" cy="0"/>
+          <a:chOff x="0" y="0"/>
+          <a:chExt cx="0" cy="0"/>
+        </a:xfrm>
+      </p:grpSpPr>
+      <p:sp>
+        <p:nvSpPr>
+          <p:cNvPr id="2" name="Title 1">
+            <a:extLst>
+              <a:ext uri="{FF2B5EF4-FFF2-40B4-BE49-F238E27FC236}">
+                <a16:creationId xmlns:a16="http://schemas.microsoft.com/office/drawing/2014/main" id="{716151FD-644E-4A0A-94CB-65461768B16E}"/>
+              </a:ext>
+            </a:extLst>
+          </p:cNvPr>
+          <p:cNvSpPr>
+            <a:spLocks noGrp="1"/>
+          </p:cNvSpPr>
+          <p:nvPr>
+            <p:ph type="title"/>
+          </p:nvPr>
+        </p:nvSpPr>
+        <p:spPr>
+          <a:xfrm>
+            <a:off x="1141412" y="770916"/>
+            <a:ext cx="9905998" cy="1478570"/>
+          </a:xfrm>
+        </p:spPr>
+        <p:txBody>
+          <a:bodyPr/>
+          <a:lstStyle/>
+          <a:p>
+            <a:r>
+              <a:rPr lang="en-US" cap="none" dirty="0">
+                <a:effectLst>
+                  <a:outerShdw blurRad="38100" dist="38100" dir="2700000" algn="tl">
+                    <a:srgbClr val="000000">
+                      <a:alpha val="43137"/>
+                    </a:srgbClr>
+                  </a:outerShdw>
+                </a:effectLst>
+              </a:rPr>
+              <a:t>Aider</a:t>
+            </a:r>
+            <a:endParaRPr lang="ru-RU" cap="none" dirty="0">
+              <a:effectLst>
+                <a:outerShdw blurRad="38100" dist="38100" dir="2700000" algn="tl">
+                  <a:srgbClr val="000000">
+                    <a:alpha val="43137"/>
+                  </a:srgbClr>
+                </a:outerShdw>
+              </a:effectLst>
+            </a:endParaRPr>
+          </a:p>
+        </p:txBody>
+      </p:sp>
+      <p:sp>
+        <p:nvSpPr>
+          <p:cNvPr id="3" name="Content Placeholder 2">
+            <a:extLst>
+              <a:ext uri="{FF2B5EF4-FFF2-40B4-BE49-F238E27FC236}">
+                <a16:creationId xmlns:a16="http://schemas.microsoft.com/office/drawing/2014/main" id="{D8AD15CE-6CDF-4389-92E4-8727AEB3FE23}"/>
+              </a:ext>
+            </a:extLst>
+          </p:cNvPr>
+          <p:cNvSpPr>
+            <a:spLocks noGrp="1"/>
+          </p:cNvSpPr>
+          <p:nvPr>
+            <p:ph idx="1"/>
+          </p:nvPr>
+        </p:nvSpPr>
+        <p:spPr>
+          <a:xfrm>
+            <a:off x="1141412" y="2041668"/>
+            <a:ext cx="9905999" cy="4386841"/>
+          </a:xfrm>
+        </p:spPr>
+        <p:txBody>
+          <a:bodyPr>
+            <a:normAutofit lnSpcReduction="10000"/>
+          </a:bodyPr>
+          <a:lstStyle/>
+          <a:p>
+            <a:pPr marL="0" indent="0">
+              <a:buNone/>
+            </a:pPr>
+            <a:r>
+              <a:rPr lang="ru-RU" b="1" i="1" dirty="0">
+                <a:effectLst>
+                  <a:outerShdw blurRad="38100" dist="38100" dir="2700000" algn="tl">
+                    <a:srgbClr val="000000">
+                      <a:alpha val="43137"/>
+                    </a:srgbClr>
+                  </a:outerShdw>
+                </a:effectLst>
+              </a:rPr>
+              <a:t>«Интеллектуальная система парного программирования в терминале»</a:t>
+            </a:r>
+            <a:endParaRPr lang="en-US" b="1" i="1" dirty="0">
+              <a:effectLst>
+                <a:outerShdw blurRad="38100" dist="38100" dir="2700000" algn="tl">
+                  <a:srgbClr val="000000">
+                    <a:alpha val="43137"/>
+                  </a:srgbClr>
+                </a:outerShdw>
+              </a:effectLst>
+            </a:endParaRPr>
+          </a:p>
+          <a:p>
+            <a:r>
+              <a:rPr lang="ru-RU" dirty="0">
+                <a:effectLst>
+                  <a:outerShdw blurRad="38100" dist="38100" dir="2700000" algn="tl">
+                    <a:srgbClr val="000000">
+                      <a:alpha val="43137"/>
+                    </a:srgbClr>
+                  </a:outerShdw>
+                </a:effectLst>
+              </a:rPr>
+              <a:t>Создаёт карту репозитория и использует её при работе.</a:t>
+            </a:r>
+          </a:p>
+          <a:p>
+            <a:r>
+              <a:rPr lang="ru-RU" dirty="0">
+                <a:effectLst>
+                  <a:outerShdw blurRad="38100" dist="38100" dir="2700000" algn="tl">
+                    <a:srgbClr val="000000">
+                      <a:alpha val="43137"/>
+                    </a:srgbClr>
+                  </a:outerShdw>
+                </a:effectLst>
+              </a:rPr>
+              <a:t>Может редактировать несколько файлов одновременно.</a:t>
+            </a:r>
+          </a:p>
+          <a:p>
+            <a:r>
+              <a:rPr lang="ru-RU" dirty="0">
+                <a:effectLst>
+                  <a:outerShdw blurRad="38100" dist="38100" dir="2700000" algn="tl">
+                    <a:srgbClr val="000000">
+                      <a:alpha val="43137"/>
+                    </a:srgbClr>
+                  </a:outerShdw>
+                </a:effectLst>
+              </a:rPr>
+              <a:t>Работает с </a:t>
+            </a:r>
+            <a:r>
+              <a:rPr lang="en-US" dirty="0">
+                <a:effectLst>
+                  <a:outerShdw blurRad="38100" dist="38100" dir="2700000" algn="tl">
+                    <a:srgbClr val="000000">
+                      <a:alpha val="43137"/>
+                    </a:srgbClr>
+                  </a:outerShdw>
+                </a:effectLst>
+              </a:rPr>
+              <a:t>Git. </a:t>
+            </a:r>
+            <a:r>
+              <a:rPr lang="ru-RU" dirty="0">
+                <a:effectLst>
+                  <a:outerShdw blurRad="38100" dist="38100" dir="2700000" algn="tl">
+                    <a:srgbClr val="000000">
+                      <a:alpha val="43137"/>
+                    </a:srgbClr>
+                  </a:outerShdw>
+                </a:effectLst>
+              </a:rPr>
+              <a:t>Автоматически создаёт </a:t>
+            </a:r>
+            <a:r>
+              <a:rPr lang="en-US" dirty="0">
+                <a:effectLst>
+                  <a:outerShdw blurRad="38100" dist="38100" dir="2700000" algn="tl">
+                    <a:srgbClr val="000000">
+                      <a:alpha val="43137"/>
+                    </a:srgbClr>
+                  </a:outerShdw>
+                </a:effectLst>
+              </a:rPr>
+              <a:t>Git commit.</a:t>
+            </a:r>
+          </a:p>
+          <a:p>
+            <a:r>
+              <a:rPr lang="ru-RU" dirty="0">
+                <a:effectLst>
+                  <a:outerShdw blurRad="38100" dist="38100" dir="2700000" algn="tl">
+                    <a:srgbClr val="000000">
+                      <a:alpha val="43137"/>
+                    </a:srgbClr>
+                  </a:outerShdw>
+                </a:effectLst>
+              </a:rPr>
+              <a:t>Может использовать различные модели, как локальные, так и удалённые.</a:t>
+            </a:r>
+          </a:p>
+          <a:p>
+            <a:r>
+              <a:rPr lang="ru-RU" dirty="0">
+                <a:effectLst>
+                  <a:outerShdw blurRad="38100" dist="38100" dir="2700000" algn="tl">
+                    <a:srgbClr val="000000">
+                      <a:alpha val="43137"/>
+                    </a:srgbClr>
+                  </a:outerShdw>
+                </a:effectLst>
+              </a:rPr>
+              <a:t>Имеет «режим архитектора», где может сам выбирать файлы для чтения и предлагать готовые решения.</a:t>
+            </a:r>
+          </a:p>
+        </p:txBody>
+      </p:sp>
+    </p:spTree>
+    <p:extLst>
+      <p:ext uri="{BB962C8B-B14F-4D97-AF65-F5344CB8AC3E}">
+        <p14:creationId xmlns:p14="http://schemas.microsoft.com/office/powerpoint/2010/main" val="508154938"/>
       </p:ext>
     </p:extLst>
   </p:cSld>
@@ -14641,6 +15896,1340 @@
 </p:sld>
 </file>
 
+<file path=ppt/slides/slide30.xml><?xml version="1.0" encoding="utf-8"?>
+<p:sld xmlns:a="http://schemas.openxmlformats.org/drawingml/2006/main" xmlns:r="http://schemas.openxmlformats.org/officeDocument/2006/relationships" xmlns:p="http://schemas.openxmlformats.org/presentationml/2006/main">
+  <p:cSld>
+    <p:spTree>
+      <p:nvGrpSpPr>
+        <p:cNvPr id="1" name=""/>
+        <p:cNvGrpSpPr/>
+        <p:nvPr/>
+      </p:nvGrpSpPr>
+      <p:grpSpPr>
+        <a:xfrm>
+          <a:off x="0" y="0"/>
+          <a:ext cx="0" cy="0"/>
+          <a:chOff x="0" y="0"/>
+          <a:chExt cx="0" cy="0"/>
+        </a:xfrm>
+      </p:grpSpPr>
+      <p:sp>
+        <p:nvSpPr>
+          <p:cNvPr id="2" name="Title 1">
+            <a:extLst>
+              <a:ext uri="{FF2B5EF4-FFF2-40B4-BE49-F238E27FC236}">
+                <a16:creationId xmlns:a16="http://schemas.microsoft.com/office/drawing/2014/main" id="{A588C37D-D9FD-491D-98E1-D9550E7C721C}"/>
+              </a:ext>
+            </a:extLst>
+          </p:cNvPr>
+          <p:cNvSpPr>
+            <a:spLocks noGrp="1"/>
+          </p:cNvSpPr>
+          <p:nvPr>
+            <p:ph type="title"/>
+          </p:nvPr>
+        </p:nvSpPr>
+        <p:spPr/>
+        <p:txBody>
+          <a:bodyPr/>
+          <a:lstStyle/>
+          <a:p>
+            <a:r>
+              <a:rPr lang="en-US" cap="none" dirty="0">
+                <a:effectLst>
+                  <a:outerShdw blurRad="38100" dist="38100" dir="2700000" algn="tl">
+                    <a:srgbClr val="000000">
+                      <a:alpha val="43137"/>
+                    </a:srgbClr>
+                  </a:outerShdw>
+                </a:effectLst>
+              </a:rPr>
+              <a:t>Aider - </a:t>
+            </a:r>
+            <a:r>
+              <a:rPr lang="ru-RU" cap="none" dirty="0">
+                <a:effectLst>
+                  <a:outerShdw blurRad="38100" dist="38100" dir="2700000" algn="tl">
+                    <a:srgbClr val="000000">
+                      <a:alpha val="43137"/>
+                    </a:srgbClr>
+                  </a:outerShdw>
+                </a:effectLst>
+              </a:rPr>
+              <a:t>запрос</a:t>
+            </a:r>
+          </a:p>
+        </p:txBody>
+      </p:sp>
+      <p:pic>
+        <p:nvPicPr>
+          <p:cNvPr id="4" name="Content Placeholder 3">
+            <a:extLst>
+              <a:ext uri="{FF2B5EF4-FFF2-40B4-BE49-F238E27FC236}">
+                <a16:creationId xmlns:a16="http://schemas.microsoft.com/office/drawing/2014/main" id="{AE21A6A3-A789-4E49-875C-D9E48B175CCA}"/>
+              </a:ext>
+            </a:extLst>
+          </p:cNvPr>
+          <p:cNvPicPr>
+            <a:picLocks noGrp="1" noChangeAspect="1"/>
+          </p:cNvPicPr>
+          <p:nvPr>
+            <p:ph idx="1"/>
+          </p:nvPr>
+        </p:nvPicPr>
+        <p:blipFill>
+          <a:blip r:embed="rId2"/>
+          <a:stretch>
+            <a:fillRect/>
+          </a:stretch>
+        </p:blipFill>
+        <p:spPr>
+          <a:xfrm>
+            <a:off x="1699503" y="2020887"/>
+            <a:ext cx="8789820" cy="3998914"/>
+          </a:xfrm>
+          <a:prstGeom prst="rect">
+            <a:avLst/>
+          </a:prstGeom>
+        </p:spPr>
+      </p:pic>
+    </p:spTree>
+    <p:extLst>
+      <p:ext uri="{BB962C8B-B14F-4D97-AF65-F5344CB8AC3E}">
+        <p14:creationId xmlns:p14="http://schemas.microsoft.com/office/powerpoint/2010/main" val="2171501057"/>
+      </p:ext>
+    </p:extLst>
+  </p:cSld>
+  <p:clrMapOvr>
+    <a:masterClrMapping/>
+  </p:clrMapOvr>
+</p:sld>
+</file>
+
+<file path=ppt/slides/slide31.xml><?xml version="1.0" encoding="utf-8"?>
+<p:sld xmlns:a="http://schemas.openxmlformats.org/drawingml/2006/main" xmlns:r="http://schemas.openxmlformats.org/officeDocument/2006/relationships" xmlns:p="http://schemas.openxmlformats.org/presentationml/2006/main">
+  <p:cSld>
+    <p:spTree>
+      <p:nvGrpSpPr>
+        <p:cNvPr id="1" name=""/>
+        <p:cNvGrpSpPr/>
+        <p:nvPr/>
+      </p:nvGrpSpPr>
+      <p:grpSpPr>
+        <a:xfrm>
+          <a:off x="0" y="0"/>
+          <a:ext cx="0" cy="0"/>
+          <a:chOff x="0" y="0"/>
+          <a:chExt cx="0" cy="0"/>
+        </a:xfrm>
+      </p:grpSpPr>
+      <p:sp>
+        <p:nvSpPr>
+          <p:cNvPr id="2" name="Title 1">
+            <a:extLst>
+              <a:ext uri="{FF2B5EF4-FFF2-40B4-BE49-F238E27FC236}">
+                <a16:creationId xmlns:a16="http://schemas.microsoft.com/office/drawing/2014/main" id="{A588C37D-D9FD-491D-98E1-D9550E7C721C}"/>
+              </a:ext>
+            </a:extLst>
+          </p:cNvPr>
+          <p:cNvSpPr>
+            <a:spLocks noGrp="1"/>
+          </p:cNvSpPr>
+          <p:nvPr>
+            <p:ph type="title"/>
+          </p:nvPr>
+        </p:nvSpPr>
+        <p:spPr/>
+        <p:txBody>
+          <a:bodyPr/>
+          <a:lstStyle/>
+          <a:p>
+            <a:r>
+              <a:rPr lang="en-US" cap="none" dirty="0">
+                <a:effectLst>
+                  <a:outerShdw blurRad="38100" dist="38100" dir="2700000" algn="tl">
+                    <a:srgbClr val="000000">
+                      <a:alpha val="43137"/>
+                    </a:srgbClr>
+                  </a:outerShdw>
+                </a:effectLst>
+              </a:rPr>
+              <a:t>Aider - </a:t>
+            </a:r>
+            <a:r>
+              <a:rPr lang="ru-RU" cap="none" dirty="0">
+                <a:effectLst>
+                  <a:outerShdw blurRad="38100" dist="38100" dir="2700000" algn="tl">
+                    <a:srgbClr val="000000">
+                      <a:alpha val="43137"/>
+                    </a:srgbClr>
+                  </a:outerShdw>
+                </a:effectLst>
+              </a:rPr>
+              <a:t>ответ</a:t>
+            </a:r>
+          </a:p>
+        </p:txBody>
+      </p:sp>
+      <p:pic>
+        <p:nvPicPr>
+          <p:cNvPr id="6" name="Content Placeholder 5">
+            <a:extLst>
+              <a:ext uri="{FF2B5EF4-FFF2-40B4-BE49-F238E27FC236}">
+                <a16:creationId xmlns:a16="http://schemas.microsoft.com/office/drawing/2014/main" id="{D7C42E58-B3BE-4913-9C41-43ED871078B0}"/>
+              </a:ext>
+            </a:extLst>
+          </p:cNvPr>
+          <p:cNvPicPr>
+            <a:picLocks noGrp="1" noChangeAspect="1"/>
+          </p:cNvPicPr>
+          <p:nvPr>
+            <p:ph idx="1"/>
+          </p:nvPr>
+        </p:nvPicPr>
+        <p:blipFill>
+          <a:blip r:embed="rId2"/>
+          <a:stretch>
+            <a:fillRect/>
+          </a:stretch>
+        </p:blipFill>
+        <p:spPr>
+          <a:xfrm>
+            <a:off x="1141413" y="1577489"/>
+            <a:ext cx="6224587" cy="5201666"/>
+          </a:xfrm>
+          <a:prstGeom prst="rect">
+            <a:avLst/>
+          </a:prstGeom>
+          <a:ln>
+            <a:noFill/>
+          </a:ln>
+          <a:effectLst>
+            <a:outerShdw blurRad="190500" algn="tl" rotWithShape="0">
+              <a:srgbClr val="000000">
+                <a:alpha val="70000"/>
+              </a:srgbClr>
+            </a:outerShdw>
+          </a:effectLst>
+        </p:spPr>
+      </p:pic>
+      <p:pic>
+        <p:nvPicPr>
+          <p:cNvPr id="7" name="Picture 6">
+            <a:extLst>
+              <a:ext uri="{FF2B5EF4-FFF2-40B4-BE49-F238E27FC236}">
+                <a16:creationId xmlns:a16="http://schemas.microsoft.com/office/drawing/2014/main" id="{0DAF4A51-E848-42A7-BCBC-3A69AF269736}"/>
+              </a:ext>
+            </a:extLst>
+          </p:cNvPr>
+          <p:cNvPicPr>
+            <a:picLocks noChangeAspect="1"/>
+          </p:cNvPicPr>
+          <p:nvPr/>
+        </p:nvPicPr>
+        <p:blipFill>
+          <a:blip r:embed="rId3"/>
+          <a:stretch>
+            <a:fillRect/>
+          </a:stretch>
+        </p:blipFill>
+        <p:spPr>
+          <a:xfrm>
+            <a:off x="6704012" y="863014"/>
+            <a:ext cx="5296639" cy="1428949"/>
+          </a:xfrm>
+          <a:prstGeom prst="rect">
+            <a:avLst/>
+          </a:prstGeom>
+          <a:ln>
+            <a:noFill/>
+          </a:ln>
+          <a:effectLst>
+            <a:outerShdw blurRad="190500" algn="tl" rotWithShape="0">
+              <a:srgbClr val="000000">
+                <a:alpha val="70000"/>
+              </a:srgbClr>
+            </a:outerShdw>
+          </a:effectLst>
+        </p:spPr>
+      </p:pic>
+    </p:spTree>
+    <p:extLst>
+      <p:ext uri="{BB962C8B-B14F-4D97-AF65-F5344CB8AC3E}">
+        <p14:creationId xmlns:p14="http://schemas.microsoft.com/office/powerpoint/2010/main" val="2392432784"/>
+      </p:ext>
+    </p:extLst>
+  </p:cSld>
+  <p:clrMapOvr>
+    <a:masterClrMapping/>
+  </p:clrMapOvr>
+</p:sld>
+</file>
+
+<file path=ppt/slides/slide32.xml><?xml version="1.0" encoding="utf-8"?>
+<p:sld xmlns:a="http://schemas.openxmlformats.org/drawingml/2006/main" xmlns:r="http://schemas.openxmlformats.org/officeDocument/2006/relationships" xmlns:p="http://schemas.openxmlformats.org/presentationml/2006/main">
+  <p:cSld>
+    <p:spTree>
+      <p:nvGrpSpPr>
+        <p:cNvPr id="1" name=""/>
+        <p:cNvGrpSpPr/>
+        <p:nvPr/>
+      </p:nvGrpSpPr>
+      <p:grpSpPr>
+        <a:xfrm>
+          <a:off x="0" y="0"/>
+          <a:ext cx="0" cy="0"/>
+          <a:chOff x="0" y="0"/>
+          <a:chExt cx="0" cy="0"/>
+        </a:xfrm>
+      </p:grpSpPr>
+      <p:sp>
+        <p:nvSpPr>
+          <p:cNvPr id="2" name="Title 1">
+            <a:extLst>
+              <a:ext uri="{FF2B5EF4-FFF2-40B4-BE49-F238E27FC236}">
+                <a16:creationId xmlns:a16="http://schemas.microsoft.com/office/drawing/2014/main" id="{A588C37D-D9FD-491D-98E1-D9550E7C721C}"/>
+              </a:ext>
+            </a:extLst>
+          </p:cNvPr>
+          <p:cNvSpPr>
+            <a:spLocks noGrp="1"/>
+          </p:cNvSpPr>
+          <p:nvPr>
+            <p:ph type="title"/>
+          </p:nvPr>
+        </p:nvSpPr>
+        <p:spPr/>
+        <p:txBody>
+          <a:bodyPr/>
+          <a:lstStyle/>
+          <a:p>
+            <a:r>
+              <a:rPr lang="en-US" cap="none" dirty="0">
+                <a:effectLst>
+                  <a:outerShdw blurRad="38100" dist="38100" dir="2700000" algn="tl">
+                    <a:srgbClr val="000000">
+                      <a:alpha val="43137"/>
+                    </a:srgbClr>
+                  </a:outerShdw>
+                </a:effectLst>
+              </a:rPr>
+              <a:t>Aider - </a:t>
+            </a:r>
+            <a:r>
+              <a:rPr lang="ru-RU" cap="none" dirty="0">
+                <a:effectLst>
+                  <a:outerShdw blurRad="38100" dist="38100" dir="2700000" algn="tl">
+                    <a:srgbClr val="000000">
+                      <a:alpha val="43137"/>
+                    </a:srgbClr>
+                  </a:outerShdw>
+                </a:effectLst>
+              </a:rPr>
+              <a:t>результат</a:t>
+            </a:r>
+          </a:p>
+        </p:txBody>
+      </p:sp>
+      <p:pic>
+        <p:nvPicPr>
+          <p:cNvPr id="11" name="Content Placeholder 10">
+            <a:extLst>
+              <a:ext uri="{FF2B5EF4-FFF2-40B4-BE49-F238E27FC236}">
+                <a16:creationId xmlns:a16="http://schemas.microsoft.com/office/drawing/2014/main" id="{B26FE05D-1979-4421-A8D6-730BB2610590}"/>
+              </a:ext>
+            </a:extLst>
+          </p:cNvPr>
+          <p:cNvPicPr>
+            <a:picLocks noGrp="1" noChangeAspect="1"/>
+          </p:cNvPicPr>
+          <p:nvPr>
+            <p:ph idx="1"/>
+          </p:nvPr>
+        </p:nvPicPr>
+        <p:blipFill>
+          <a:blip r:embed="rId2"/>
+          <a:stretch>
+            <a:fillRect/>
+          </a:stretch>
+        </p:blipFill>
+        <p:spPr>
+          <a:xfrm>
+            <a:off x="1611934" y="2249488"/>
+            <a:ext cx="8964957" cy="3541712"/>
+          </a:xfrm>
+          <a:prstGeom prst="rect">
+            <a:avLst/>
+          </a:prstGeom>
+        </p:spPr>
+      </p:pic>
+    </p:spTree>
+    <p:extLst>
+      <p:ext uri="{BB962C8B-B14F-4D97-AF65-F5344CB8AC3E}">
+        <p14:creationId xmlns:p14="http://schemas.microsoft.com/office/powerpoint/2010/main" val="3806996865"/>
+      </p:ext>
+    </p:extLst>
+  </p:cSld>
+  <p:clrMapOvr>
+    <a:masterClrMapping/>
+  </p:clrMapOvr>
+</p:sld>
+</file>
+
+<file path=ppt/slides/slide33.xml><?xml version="1.0" encoding="utf-8"?>
+<p:sld xmlns:a="http://schemas.openxmlformats.org/drawingml/2006/main" xmlns:r="http://schemas.openxmlformats.org/officeDocument/2006/relationships" xmlns:p="http://schemas.openxmlformats.org/presentationml/2006/main">
+  <p:cSld>
+    <p:spTree>
+      <p:nvGrpSpPr>
+        <p:cNvPr id="1" name=""/>
+        <p:cNvGrpSpPr/>
+        <p:nvPr/>
+      </p:nvGrpSpPr>
+      <p:grpSpPr>
+        <a:xfrm>
+          <a:off x="0" y="0"/>
+          <a:ext cx="0" cy="0"/>
+          <a:chOff x="0" y="0"/>
+          <a:chExt cx="0" cy="0"/>
+        </a:xfrm>
+      </p:grpSpPr>
+      <p:sp>
+        <p:nvSpPr>
+          <p:cNvPr id="2" name="Title 1">
+            <a:extLst>
+              <a:ext uri="{FF2B5EF4-FFF2-40B4-BE49-F238E27FC236}">
+                <a16:creationId xmlns:a16="http://schemas.microsoft.com/office/drawing/2014/main" id="{A588C37D-D9FD-491D-98E1-D9550E7C721C}"/>
+              </a:ext>
+            </a:extLst>
+          </p:cNvPr>
+          <p:cNvSpPr>
+            <a:spLocks noGrp="1"/>
+          </p:cNvSpPr>
+          <p:nvPr>
+            <p:ph type="title"/>
+          </p:nvPr>
+        </p:nvSpPr>
+        <p:spPr/>
+        <p:txBody>
+          <a:bodyPr/>
+          <a:lstStyle/>
+          <a:p>
+            <a:r>
+              <a:rPr lang="en-US" cap="none" dirty="0">
+                <a:effectLst>
+                  <a:outerShdw blurRad="38100" dist="38100" dir="2700000" algn="tl">
+                    <a:srgbClr val="000000">
+                      <a:alpha val="43137"/>
+                    </a:srgbClr>
+                  </a:outerShdw>
+                </a:effectLst>
+              </a:rPr>
+              <a:t>Aider – Architect mode - </a:t>
+            </a:r>
+            <a:r>
+              <a:rPr lang="ru-RU" cap="none" dirty="0">
+                <a:effectLst>
+                  <a:outerShdw blurRad="38100" dist="38100" dir="2700000" algn="tl">
+                    <a:srgbClr val="000000">
+                      <a:alpha val="43137"/>
+                    </a:srgbClr>
+                  </a:outerShdw>
+                </a:effectLst>
+              </a:rPr>
+              <a:t>запрос</a:t>
+            </a:r>
+          </a:p>
+        </p:txBody>
+      </p:sp>
+      <p:pic>
+        <p:nvPicPr>
+          <p:cNvPr id="5" name="Content Placeholder 4">
+            <a:extLst>
+              <a:ext uri="{FF2B5EF4-FFF2-40B4-BE49-F238E27FC236}">
+                <a16:creationId xmlns:a16="http://schemas.microsoft.com/office/drawing/2014/main" id="{1A0BCD88-7FAA-476B-9332-219F23D93BDE}"/>
+              </a:ext>
+            </a:extLst>
+          </p:cNvPr>
+          <p:cNvPicPr>
+            <a:picLocks noGrp="1" noChangeAspect="1"/>
+          </p:cNvPicPr>
+          <p:nvPr>
+            <p:ph idx="1"/>
+          </p:nvPr>
+        </p:nvPicPr>
+        <p:blipFill>
+          <a:blip r:embed="rId2"/>
+          <a:stretch>
+            <a:fillRect/>
+          </a:stretch>
+        </p:blipFill>
+        <p:spPr>
+          <a:xfrm>
+            <a:off x="953473" y="2623560"/>
+            <a:ext cx="10281880" cy="2793568"/>
+          </a:xfrm>
+          <a:prstGeom prst="rect">
+            <a:avLst/>
+          </a:prstGeom>
+        </p:spPr>
+      </p:pic>
+    </p:spTree>
+    <p:extLst>
+      <p:ext uri="{BB962C8B-B14F-4D97-AF65-F5344CB8AC3E}">
+        <p14:creationId xmlns:p14="http://schemas.microsoft.com/office/powerpoint/2010/main" val="4014856021"/>
+      </p:ext>
+    </p:extLst>
+  </p:cSld>
+  <p:clrMapOvr>
+    <a:masterClrMapping/>
+  </p:clrMapOvr>
+</p:sld>
+</file>
+
+<file path=ppt/slides/slide34.xml><?xml version="1.0" encoding="utf-8"?>
+<p:sld xmlns:a="http://schemas.openxmlformats.org/drawingml/2006/main" xmlns:r="http://schemas.openxmlformats.org/officeDocument/2006/relationships" xmlns:p="http://schemas.openxmlformats.org/presentationml/2006/main">
+  <p:cSld>
+    <p:spTree>
+      <p:nvGrpSpPr>
+        <p:cNvPr id="1" name=""/>
+        <p:cNvGrpSpPr/>
+        <p:nvPr/>
+      </p:nvGrpSpPr>
+      <p:grpSpPr>
+        <a:xfrm>
+          <a:off x="0" y="0"/>
+          <a:ext cx="0" cy="0"/>
+          <a:chOff x="0" y="0"/>
+          <a:chExt cx="0" cy="0"/>
+        </a:xfrm>
+      </p:grpSpPr>
+      <p:sp>
+        <p:nvSpPr>
+          <p:cNvPr id="2" name="Title 1">
+            <a:extLst>
+              <a:ext uri="{FF2B5EF4-FFF2-40B4-BE49-F238E27FC236}">
+                <a16:creationId xmlns:a16="http://schemas.microsoft.com/office/drawing/2014/main" id="{A588C37D-D9FD-491D-98E1-D9550E7C721C}"/>
+              </a:ext>
+            </a:extLst>
+          </p:cNvPr>
+          <p:cNvSpPr>
+            <a:spLocks noGrp="1"/>
+          </p:cNvSpPr>
+          <p:nvPr>
+            <p:ph type="title"/>
+          </p:nvPr>
+        </p:nvSpPr>
+        <p:spPr/>
+        <p:txBody>
+          <a:bodyPr/>
+          <a:lstStyle/>
+          <a:p>
+            <a:r>
+              <a:rPr lang="en-US" cap="none" dirty="0">
+                <a:effectLst>
+                  <a:outerShdw blurRad="38100" dist="38100" dir="2700000" algn="tl">
+                    <a:srgbClr val="000000">
+                      <a:alpha val="43137"/>
+                    </a:srgbClr>
+                  </a:outerShdw>
+                </a:effectLst>
+              </a:rPr>
+              <a:t>Aider – Architect mode - </a:t>
+            </a:r>
+            <a:r>
+              <a:rPr lang="ru-RU" cap="none" dirty="0">
+                <a:effectLst>
+                  <a:outerShdw blurRad="38100" dist="38100" dir="2700000" algn="tl">
+                    <a:srgbClr val="000000">
+                      <a:alpha val="43137"/>
+                    </a:srgbClr>
+                  </a:outerShdw>
+                </a:effectLst>
+              </a:rPr>
+              <a:t>результат</a:t>
+            </a:r>
+          </a:p>
+        </p:txBody>
+      </p:sp>
+      <p:pic>
+        <p:nvPicPr>
+          <p:cNvPr id="6" name="Content Placeholder 5">
+            <a:extLst>
+              <a:ext uri="{FF2B5EF4-FFF2-40B4-BE49-F238E27FC236}">
+                <a16:creationId xmlns:a16="http://schemas.microsoft.com/office/drawing/2014/main" id="{BE0CB02A-25DE-43E7-BFAD-5455F0FBEF9B}"/>
+              </a:ext>
+            </a:extLst>
+          </p:cNvPr>
+          <p:cNvPicPr>
+            <a:picLocks noGrp="1" noChangeAspect="1"/>
+          </p:cNvPicPr>
+          <p:nvPr>
+            <p:ph idx="1"/>
+          </p:nvPr>
+        </p:nvPicPr>
+        <p:blipFill>
+          <a:blip r:embed="rId2"/>
+          <a:stretch>
+            <a:fillRect/>
+          </a:stretch>
+        </p:blipFill>
+        <p:spPr>
+          <a:xfrm>
+            <a:off x="1169617" y="2263342"/>
+            <a:ext cx="9849592" cy="3514004"/>
+          </a:xfrm>
+          <a:prstGeom prst="rect">
+            <a:avLst/>
+          </a:prstGeom>
+          <a:ln>
+            <a:noFill/>
+          </a:ln>
+          <a:effectLst>
+            <a:outerShdw blurRad="292100" dist="139700" dir="2700000" algn="tl" rotWithShape="0">
+              <a:srgbClr val="333333">
+                <a:alpha val="65000"/>
+              </a:srgbClr>
+            </a:outerShdw>
+          </a:effectLst>
+        </p:spPr>
+      </p:pic>
+    </p:spTree>
+    <p:extLst>
+      <p:ext uri="{BB962C8B-B14F-4D97-AF65-F5344CB8AC3E}">
+        <p14:creationId xmlns:p14="http://schemas.microsoft.com/office/powerpoint/2010/main" val="3591918197"/>
+      </p:ext>
+    </p:extLst>
+  </p:cSld>
+  <p:clrMapOvr>
+    <a:masterClrMapping/>
+  </p:clrMapOvr>
+</p:sld>
+</file>
+
+<file path=ppt/slides/slide35.xml><?xml version="1.0" encoding="utf-8"?>
+<p:sld xmlns:a="http://schemas.openxmlformats.org/drawingml/2006/main" xmlns:r="http://schemas.openxmlformats.org/officeDocument/2006/relationships" xmlns:p="http://schemas.openxmlformats.org/presentationml/2006/main">
+  <p:cSld>
+    <p:spTree>
+      <p:nvGrpSpPr>
+        <p:cNvPr id="1" name=""/>
+        <p:cNvGrpSpPr/>
+        <p:nvPr/>
+      </p:nvGrpSpPr>
+      <p:grpSpPr>
+        <a:xfrm>
+          <a:off x="0" y="0"/>
+          <a:ext cx="0" cy="0"/>
+          <a:chOff x="0" y="0"/>
+          <a:chExt cx="0" cy="0"/>
+        </a:xfrm>
+      </p:grpSpPr>
+      <p:sp>
+        <p:nvSpPr>
+          <p:cNvPr id="2" name="Title 1">
+            <a:extLst>
+              <a:ext uri="{FF2B5EF4-FFF2-40B4-BE49-F238E27FC236}">
+                <a16:creationId xmlns:a16="http://schemas.microsoft.com/office/drawing/2014/main" id="{F1DB0F2B-32E7-48AC-982C-A740C1B68D32}"/>
+              </a:ext>
+            </a:extLst>
+          </p:cNvPr>
+          <p:cNvSpPr>
+            <a:spLocks noGrp="1"/>
+          </p:cNvSpPr>
+          <p:nvPr>
+            <p:ph type="title"/>
+          </p:nvPr>
+        </p:nvSpPr>
+        <p:spPr/>
+        <p:txBody>
+          <a:bodyPr/>
+          <a:lstStyle/>
+          <a:p>
+            <a:r>
+              <a:rPr lang="en-US" cap="none" dirty="0">
+                <a:effectLst>
+                  <a:outerShdw blurRad="38100" dist="38100" dir="2700000" algn="tl">
+                    <a:srgbClr val="000000">
+                      <a:alpha val="43137"/>
+                    </a:srgbClr>
+                  </a:outerShdw>
+                </a:effectLst>
+              </a:rPr>
+              <a:t>Windsurf</a:t>
+            </a:r>
+            <a:endParaRPr lang="ru-RU" cap="none" dirty="0">
+              <a:effectLst>
+                <a:outerShdw blurRad="38100" dist="38100" dir="2700000" algn="tl">
+                  <a:srgbClr val="000000">
+                    <a:alpha val="43137"/>
+                  </a:srgbClr>
+                </a:outerShdw>
+              </a:effectLst>
+            </a:endParaRPr>
+          </a:p>
+        </p:txBody>
+      </p:sp>
+      <p:sp>
+        <p:nvSpPr>
+          <p:cNvPr id="3" name="Content Placeholder 2">
+            <a:extLst>
+              <a:ext uri="{FF2B5EF4-FFF2-40B4-BE49-F238E27FC236}">
+                <a16:creationId xmlns:a16="http://schemas.microsoft.com/office/drawing/2014/main" id="{E4FEC775-170E-47CA-979D-E87F4855292C}"/>
+              </a:ext>
+            </a:extLst>
+          </p:cNvPr>
+          <p:cNvSpPr>
+            <a:spLocks noGrp="1"/>
+          </p:cNvSpPr>
+          <p:nvPr>
+            <p:ph idx="1"/>
+          </p:nvPr>
+        </p:nvSpPr>
+        <p:spPr/>
+        <p:txBody>
+          <a:bodyPr/>
+          <a:lstStyle/>
+          <a:p>
+            <a:endParaRPr lang="ru-RU" dirty="0"/>
+          </a:p>
+        </p:txBody>
+      </p:sp>
+    </p:spTree>
+    <p:extLst>
+      <p:ext uri="{BB962C8B-B14F-4D97-AF65-F5344CB8AC3E}">
+        <p14:creationId xmlns:p14="http://schemas.microsoft.com/office/powerpoint/2010/main" val="1662028632"/>
+      </p:ext>
+    </p:extLst>
+  </p:cSld>
+  <p:clrMapOvr>
+    <a:masterClrMapping/>
+  </p:clrMapOvr>
+</p:sld>
+</file>
+
+<file path=ppt/slides/slide36.xml><?xml version="1.0" encoding="utf-8"?>
+<p:sld xmlns:a="http://schemas.openxmlformats.org/drawingml/2006/main" xmlns:r="http://schemas.openxmlformats.org/officeDocument/2006/relationships" xmlns:p="http://schemas.openxmlformats.org/presentationml/2006/main">
+  <p:cSld>
+    <p:spTree>
+      <p:nvGrpSpPr>
+        <p:cNvPr id="1" name=""/>
+        <p:cNvGrpSpPr/>
+        <p:nvPr/>
+      </p:nvGrpSpPr>
+      <p:grpSpPr>
+        <a:xfrm>
+          <a:off x="0" y="0"/>
+          <a:ext cx="0" cy="0"/>
+          <a:chOff x="0" y="0"/>
+          <a:chExt cx="0" cy="0"/>
+        </a:xfrm>
+      </p:grpSpPr>
+      <p:sp>
+        <p:nvSpPr>
+          <p:cNvPr id="3" name="Content Placeholder 2">
+            <a:extLst>
+              <a:ext uri="{FF2B5EF4-FFF2-40B4-BE49-F238E27FC236}">
+                <a16:creationId xmlns:a16="http://schemas.microsoft.com/office/drawing/2014/main" id="{50314D76-FCD4-4820-8E99-DEDA46E1C705}"/>
+              </a:ext>
+            </a:extLst>
+          </p:cNvPr>
+          <p:cNvSpPr>
+            <a:spLocks noGrp="1"/>
+          </p:cNvSpPr>
+          <p:nvPr>
+            <p:ph idx="1"/>
+          </p:nvPr>
+        </p:nvSpPr>
+        <p:spPr/>
+        <p:txBody>
+          <a:bodyPr/>
+          <a:lstStyle/>
+          <a:p>
+            <a:r>
+              <a:rPr lang="ru-RU" dirty="0"/>
+              <a:t>Расширение для </a:t>
+            </a:r>
+            <a:r>
+              <a:rPr lang="en-US" dirty="0"/>
+              <a:t>VS</a:t>
+            </a:r>
+            <a:r>
+              <a:rPr lang="ru-RU" dirty="0"/>
+              <a:t> </a:t>
+            </a:r>
+            <a:r>
+              <a:rPr lang="en-US" dirty="0"/>
+              <a:t>Code</a:t>
+            </a:r>
+            <a:r>
+              <a:rPr lang="ru-RU" dirty="0"/>
+              <a:t>.</a:t>
+            </a:r>
+            <a:endParaRPr lang="en-US" dirty="0"/>
+          </a:p>
+          <a:p>
+            <a:r>
+              <a:rPr lang="ru-RU" dirty="0"/>
+              <a:t>Работает как с локальными, так и с удалёнными моделями.</a:t>
+            </a:r>
+          </a:p>
+          <a:p>
+            <a:r>
+              <a:rPr lang="ru-RU" dirty="0"/>
+              <a:t>Умеет запускать команды в терминале и проверять их результат.</a:t>
+            </a:r>
+          </a:p>
+          <a:p>
+            <a:r>
+              <a:rPr lang="ru-RU" dirty="0"/>
+              <a:t>При наличии у модели возможности – разрешает также отсылать скриншоты и использовать (виртуальный?) браузер для автоматизированной проверки результатов, включая имитацию курсора мыши и ввода с клавиатуры.</a:t>
+            </a:r>
+          </a:p>
+        </p:txBody>
+      </p:sp>
+      <p:sp>
+        <p:nvSpPr>
+          <p:cNvPr id="4" name="Title 1">
+            <a:extLst>
+              <a:ext uri="{FF2B5EF4-FFF2-40B4-BE49-F238E27FC236}">
+                <a16:creationId xmlns:a16="http://schemas.microsoft.com/office/drawing/2014/main" id="{B6E746CA-290C-42D9-98CC-B15E04D81932}"/>
+              </a:ext>
+            </a:extLst>
+          </p:cNvPr>
+          <p:cNvSpPr>
+            <a:spLocks noGrp="1"/>
+          </p:cNvSpPr>
+          <p:nvPr>
+            <p:ph type="title"/>
+          </p:nvPr>
+        </p:nvSpPr>
+        <p:spPr>
+          <a:xfrm>
+            <a:off x="1141413" y="619125"/>
+            <a:ext cx="9906000" cy="1477963"/>
+          </a:xfrm>
+        </p:spPr>
+        <p:txBody>
+          <a:bodyPr/>
+          <a:lstStyle/>
+          <a:p>
+            <a:r>
+              <a:rPr lang="en-US" cap="none" dirty="0">
+                <a:effectLst>
+                  <a:outerShdw blurRad="38100" dist="38100" dir="2700000" algn="tl">
+                    <a:srgbClr val="000000">
+                      <a:alpha val="43137"/>
+                    </a:srgbClr>
+                  </a:outerShdw>
+                </a:effectLst>
+              </a:rPr>
+              <a:t>Cline</a:t>
+            </a:r>
+            <a:endParaRPr lang="ru-RU" cap="none" dirty="0">
+              <a:effectLst>
+                <a:outerShdw blurRad="38100" dist="38100" dir="2700000" algn="tl">
+                  <a:srgbClr val="000000">
+                    <a:alpha val="43137"/>
+                  </a:srgbClr>
+                </a:outerShdw>
+              </a:effectLst>
+            </a:endParaRPr>
+          </a:p>
+        </p:txBody>
+      </p:sp>
+    </p:spTree>
+    <p:extLst>
+      <p:ext uri="{BB962C8B-B14F-4D97-AF65-F5344CB8AC3E}">
+        <p14:creationId xmlns:p14="http://schemas.microsoft.com/office/powerpoint/2010/main" val="1982927983"/>
+      </p:ext>
+    </p:extLst>
+  </p:cSld>
+  <p:clrMapOvr>
+    <a:masterClrMapping/>
+  </p:clrMapOvr>
+</p:sld>
+</file>
+
+<file path=ppt/slides/slide37.xml><?xml version="1.0" encoding="utf-8"?>
+<p:sld xmlns:a="http://schemas.openxmlformats.org/drawingml/2006/main" xmlns:r="http://schemas.openxmlformats.org/officeDocument/2006/relationships" xmlns:p="http://schemas.openxmlformats.org/presentationml/2006/main">
+  <p:cSld>
+    <p:spTree>
+      <p:nvGrpSpPr>
+        <p:cNvPr id="1" name=""/>
+        <p:cNvGrpSpPr/>
+        <p:nvPr/>
+      </p:nvGrpSpPr>
+      <p:grpSpPr>
+        <a:xfrm>
+          <a:off x="0" y="0"/>
+          <a:ext cx="0" cy="0"/>
+          <a:chOff x="0" y="0"/>
+          <a:chExt cx="0" cy="0"/>
+        </a:xfrm>
+      </p:grpSpPr>
+      <p:sp>
+        <p:nvSpPr>
+          <p:cNvPr id="2" name="Title 1">
+            <a:extLst>
+              <a:ext uri="{FF2B5EF4-FFF2-40B4-BE49-F238E27FC236}">
+                <a16:creationId xmlns:a16="http://schemas.microsoft.com/office/drawing/2014/main" id="{F1DB0F2B-32E7-48AC-982C-A740C1B68D32}"/>
+              </a:ext>
+            </a:extLst>
+          </p:cNvPr>
+          <p:cNvSpPr>
+            <a:spLocks noGrp="1"/>
+          </p:cNvSpPr>
+          <p:nvPr>
+            <p:ph type="title"/>
+          </p:nvPr>
+        </p:nvSpPr>
+        <p:spPr/>
+        <p:txBody>
+          <a:bodyPr/>
+          <a:lstStyle/>
+          <a:p>
+            <a:r>
+              <a:rPr lang="en-US" cap="none" dirty="0">
+                <a:effectLst>
+                  <a:outerShdw blurRad="38100" dist="38100" dir="2700000" algn="tl">
+                    <a:srgbClr val="000000">
+                      <a:alpha val="43137"/>
+                    </a:srgbClr>
+                  </a:outerShdw>
+                </a:effectLst>
+              </a:rPr>
+              <a:t>Cline</a:t>
+            </a:r>
+            <a:endParaRPr lang="ru-RU" cap="none" dirty="0">
+              <a:effectLst>
+                <a:outerShdw blurRad="38100" dist="38100" dir="2700000" algn="tl">
+                  <a:srgbClr val="000000">
+                    <a:alpha val="43137"/>
+                  </a:srgbClr>
+                </a:outerShdw>
+              </a:effectLst>
+            </a:endParaRPr>
+          </a:p>
+        </p:txBody>
+      </p:sp>
+      <p:pic>
+        <p:nvPicPr>
+          <p:cNvPr id="5" name="Content Placeholder 4">
+            <a:extLst>
+              <a:ext uri="{FF2B5EF4-FFF2-40B4-BE49-F238E27FC236}">
+                <a16:creationId xmlns:a16="http://schemas.microsoft.com/office/drawing/2014/main" id="{4B7BD189-CD90-40DE-A72F-1A7439722010}"/>
+              </a:ext>
+            </a:extLst>
+          </p:cNvPr>
+          <p:cNvPicPr>
+            <a:picLocks noGrp="1" noChangeAspect="1"/>
+          </p:cNvPicPr>
+          <p:nvPr>
+            <p:ph idx="1"/>
+          </p:nvPr>
+        </p:nvPicPr>
+        <p:blipFill>
+          <a:blip r:embed="rId2">
+            <a:extLst>
+              <a:ext uri="{28A0092B-C50C-407E-A947-70E740481C1C}">
+                <a14:useLocalDpi xmlns:a14="http://schemas.microsoft.com/office/drawing/2010/main" val="0"/>
+              </a:ext>
+            </a:extLst>
+          </a:blip>
+          <a:stretch>
+            <a:fillRect/>
+          </a:stretch>
+        </p:blipFill>
+        <p:spPr>
+          <a:xfrm>
+            <a:off x="632619" y="1630488"/>
+            <a:ext cx="4065587" cy="2265113"/>
+          </a:xfrm>
+          <a:prstGeom prst="rect">
+            <a:avLst/>
+          </a:prstGeom>
+          <a:ln>
+            <a:noFill/>
+          </a:ln>
+          <a:effectLst>
+            <a:outerShdw blurRad="190500" algn="tl" rotWithShape="0">
+              <a:srgbClr val="000000">
+                <a:alpha val="70000"/>
+              </a:srgbClr>
+            </a:outerShdw>
+          </a:effectLst>
+        </p:spPr>
+      </p:pic>
+      <p:pic>
+        <p:nvPicPr>
+          <p:cNvPr id="7" name="Picture 6">
+            <a:extLst>
+              <a:ext uri="{FF2B5EF4-FFF2-40B4-BE49-F238E27FC236}">
+                <a16:creationId xmlns:a16="http://schemas.microsoft.com/office/drawing/2014/main" id="{8E7E5914-B587-405A-9282-9DE8337099FE}"/>
+              </a:ext>
+            </a:extLst>
+          </p:cNvPr>
+          <p:cNvPicPr>
+            <a:picLocks noChangeAspect="1"/>
+          </p:cNvPicPr>
+          <p:nvPr/>
+        </p:nvPicPr>
+        <p:blipFill>
+          <a:blip r:embed="rId3">
+            <a:extLst>
+              <a:ext uri="{28A0092B-C50C-407E-A947-70E740481C1C}">
+                <a14:useLocalDpi xmlns:a14="http://schemas.microsoft.com/office/drawing/2010/main" val="0"/>
+              </a:ext>
+            </a:extLst>
+          </a:blip>
+          <a:stretch>
+            <a:fillRect/>
+          </a:stretch>
+        </p:blipFill>
+        <p:spPr>
+          <a:xfrm>
+            <a:off x="2819400" y="2517905"/>
+            <a:ext cx="4319587" cy="2755391"/>
+          </a:xfrm>
+          <a:prstGeom prst="rect">
+            <a:avLst/>
+          </a:prstGeom>
+          <a:ln>
+            <a:noFill/>
+          </a:ln>
+          <a:effectLst>
+            <a:outerShdw blurRad="190500" algn="tl" rotWithShape="0">
+              <a:srgbClr val="000000">
+                <a:alpha val="70000"/>
+              </a:srgbClr>
+            </a:outerShdw>
+          </a:effectLst>
+        </p:spPr>
+      </p:pic>
+      <p:pic>
+        <p:nvPicPr>
+          <p:cNvPr id="9" name="Picture 8">
+            <a:extLst>
+              <a:ext uri="{FF2B5EF4-FFF2-40B4-BE49-F238E27FC236}">
+                <a16:creationId xmlns:a16="http://schemas.microsoft.com/office/drawing/2014/main" id="{DECF54B0-9F1A-47CC-A395-0A55D8C996D5}"/>
+              </a:ext>
+            </a:extLst>
+          </p:cNvPr>
+          <p:cNvPicPr>
+            <a:picLocks noChangeAspect="1"/>
+          </p:cNvPicPr>
+          <p:nvPr/>
+        </p:nvPicPr>
+        <p:blipFill>
+          <a:blip r:embed="rId4">
+            <a:extLst>
+              <a:ext uri="{28A0092B-C50C-407E-A947-70E740481C1C}">
+                <a14:useLocalDpi xmlns:a14="http://schemas.microsoft.com/office/drawing/2010/main" val="0"/>
+              </a:ext>
+            </a:extLst>
+          </a:blip>
+          <a:stretch>
+            <a:fillRect/>
+          </a:stretch>
+        </p:blipFill>
+        <p:spPr>
+          <a:xfrm>
+            <a:off x="7037387" y="418490"/>
+            <a:ext cx="4518818" cy="4433786"/>
+          </a:xfrm>
+          <a:prstGeom prst="rect">
+            <a:avLst/>
+          </a:prstGeom>
+          <a:ln>
+            <a:noFill/>
+          </a:ln>
+          <a:effectLst>
+            <a:outerShdw blurRad="190500" algn="tl" rotWithShape="0">
+              <a:srgbClr val="000000">
+                <a:alpha val="70000"/>
+              </a:srgbClr>
+            </a:outerShdw>
+          </a:effectLst>
+        </p:spPr>
+      </p:pic>
+    </p:spTree>
+    <p:extLst>
+      <p:ext uri="{BB962C8B-B14F-4D97-AF65-F5344CB8AC3E}">
+        <p14:creationId xmlns:p14="http://schemas.microsoft.com/office/powerpoint/2010/main" val="3223805847"/>
+      </p:ext>
+    </p:extLst>
+  </p:cSld>
+  <p:clrMapOvr>
+    <a:masterClrMapping/>
+  </p:clrMapOvr>
+</p:sld>
+</file>
+
+<file path=ppt/slides/slide38.xml><?xml version="1.0" encoding="utf-8"?>
+<p:sld xmlns:a="http://schemas.openxmlformats.org/drawingml/2006/main" xmlns:r="http://schemas.openxmlformats.org/officeDocument/2006/relationships" xmlns:p="http://schemas.openxmlformats.org/presentationml/2006/main">
+  <p:cSld>
+    <p:spTree>
+      <p:nvGrpSpPr>
+        <p:cNvPr id="1" name=""/>
+        <p:cNvGrpSpPr/>
+        <p:nvPr/>
+      </p:nvGrpSpPr>
+      <p:grpSpPr>
+        <a:xfrm>
+          <a:off x="0" y="0"/>
+          <a:ext cx="0" cy="0"/>
+          <a:chOff x="0" y="0"/>
+          <a:chExt cx="0" cy="0"/>
+        </a:xfrm>
+      </p:grpSpPr>
+      <p:sp>
+        <p:nvSpPr>
+          <p:cNvPr id="2" name="Title 1">
+            <a:extLst>
+              <a:ext uri="{FF2B5EF4-FFF2-40B4-BE49-F238E27FC236}">
+                <a16:creationId xmlns:a16="http://schemas.microsoft.com/office/drawing/2014/main" id="{F1DB0F2B-32E7-48AC-982C-A740C1B68D32}"/>
+              </a:ext>
+            </a:extLst>
+          </p:cNvPr>
+          <p:cNvSpPr>
+            <a:spLocks noGrp="1"/>
+          </p:cNvSpPr>
+          <p:nvPr>
+            <p:ph type="title"/>
+          </p:nvPr>
+        </p:nvSpPr>
+        <p:spPr/>
+        <p:txBody>
+          <a:bodyPr/>
+          <a:lstStyle/>
+          <a:p>
+            <a:r>
+              <a:rPr lang="en-US" cap="none" dirty="0">
+                <a:effectLst>
+                  <a:outerShdw blurRad="38100" dist="38100" dir="2700000" algn="tl">
+                    <a:srgbClr val="000000">
+                      <a:alpha val="43137"/>
+                    </a:srgbClr>
+                  </a:outerShdw>
+                </a:effectLst>
+              </a:rPr>
+              <a:t>Cline</a:t>
+            </a:r>
+            <a:endParaRPr lang="ru-RU" cap="none" dirty="0">
+              <a:effectLst>
+                <a:outerShdw blurRad="38100" dist="38100" dir="2700000" algn="tl">
+                  <a:srgbClr val="000000">
+                    <a:alpha val="43137"/>
+                  </a:srgbClr>
+                </a:outerShdw>
+              </a:effectLst>
+            </a:endParaRPr>
+          </a:p>
+        </p:txBody>
+      </p:sp>
+      <p:pic>
+        <p:nvPicPr>
+          <p:cNvPr id="11" name="Picture 10">
+            <a:extLst>
+              <a:ext uri="{FF2B5EF4-FFF2-40B4-BE49-F238E27FC236}">
+                <a16:creationId xmlns:a16="http://schemas.microsoft.com/office/drawing/2014/main" id="{EBE05BB5-935E-4592-A4D2-6A4BA55CF719}"/>
+              </a:ext>
+            </a:extLst>
+          </p:cNvPr>
+          <p:cNvPicPr>
+            <a:picLocks noChangeAspect="1"/>
+          </p:cNvPicPr>
+          <p:nvPr/>
+        </p:nvPicPr>
+        <p:blipFill>
+          <a:blip r:embed="rId2">
+            <a:extLst>
+              <a:ext uri="{28A0092B-C50C-407E-A947-70E740481C1C}">
+                <a14:useLocalDpi xmlns:a14="http://schemas.microsoft.com/office/drawing/2010/main" val="0"/>
+              </a:ext>
+            </a:extLst>
+          </a:blip>
+          <a:stretch>
+            <a:fillRect/>
+          </a:stretch>
+        </p:blipFill>
+        <p:spPr>
+          <a:xfrm>
+            <a:off x="2267621" y="587011"/>
+            <a:ext cx="4529382" cy="5652471"/>
+          </a:xfrm>
+          <a:prstGeom prst="rect">
+            <a:avLst/>
+          </a:prstGeom>
+          <a:ln>
+            <a:noFill/>
+          </a:ln>
+          <a:effectLst>
+            <a:outerShdw blurRad="190500" algn="tl" rotWithShape="0">
+              <a:srgbClr val="000000">
+                <a:alpha val="70000"/>
+              </a:srgbClr>
+            </a:outerShdw>
+          </a:effectLst>
+        </p:spPr>
+      </p:pic>
+      <p:pic>
+        <p:nvPicPr>
+          <p:cNvPr id="12" name="Picture 11">
+            <a:extLst>
+              <a:ext uri="{FF2B5EF4-FFF2-40B4-BE49-F238E27FC236}">
+                <a16:creationId xmlns:a16="http://schemas.microsoft.com/office/drawing/2014/main" id="{81EAEF06-6F5F-4A6C-A074-2D72EDF5C32B}"/>
+              </a:ext>
+            </a:extLst>
+          </p:cNvPr>
+          <p:cNvPicPr>
+            <a:picLocks noChangeAspect="1"/>
+          </p:cNvPicPr>
+          <p:nvPr/>
+        </p:nvPicPr>
+        <p:blipFill>
+          <a:blip r:embed="rId3"/>
+          <a:stretch>
+            <a:fillRect/>
+          </a:stretch>
+        </p:blipFill>
+        <p:spPr>
+          <a:xfrm>
+            <a:off x="7124492" y="256811"/>
+            <a:ext cx="3797508" cy="6097921"/>
+          </a:xfrm>
+          <a:prstGeom prst="rect">
+            <a:avLst/>
+          </a:prstGeom>
+          <a:ln>
+            <a:noFill/>
+          </a:ln>
+          <a:effectLst>
+            <a:outerShdw blurRad="190500" algn="tl" rotWithShape="0">
+              <a:srgbClr val="000000">
+                <a:alpha val="70000"/>
+              </a:srgbClr>
+            </a:outerShdw>
+          </a:effectLst>
+        </p:spPr>
+      </p:pic>
+    </p:spTree>
+    <p:extLst>
+      <p:ext uri="{BB962C8B-B14F-4D97-AF65-F5344CB8AC3E}">
+        <p14:creationId xmlns:p14="http://schemas.microsoft.com/office/powerpoint/2010/main" val="2036930812"/>
+      </p:ext>
+    </p:extLst>
+  </p:cSld>
+  <p:clrMapOvr>
+    <a:masterClrMapping/>
+  </p:clrMapOvr>
+</p:sld>
+</file>
+
+<file path=ppt/slides/slide39.xml><?xml version="1.0" encoding="utf-8"?>
+<p:sld xmlns:a="http://schemas.openxmlformats.org/drawingml/2006/main" xmlns:r="http://schemas.openxmlformats.org/officeDocument/2006/relationships" xmlns:p="http://schemas.openxmlformats.org/presentationml/2006/main">
+  <p:cSld>
+    <p:spTree>
+      <p:nvGrpSpPr>
+        <p:cNvPr id="1" name=""/>
+        <p:cNvGrpSpPr/>
+        <p:nvPr/>
+      </p:nvGrpSpPr>
+      <p:grpSpPr>
+        <a:xfrm>
+          <a:off x="0" y="0"/>
+          <a:ext cx="0" cy="0"/>
+          <a:chOff x="0" y="0"/>
+          <a:chExt cx="0" cy="0"/>
+        </a:xfrm>
+      </p:grpSpPr>
+      <p:sp>
+        <p:nvSpPr>
+          <p:cNvPr id="2" name="Title 1">
+            <a:extLst>
+              <a:ext uri="{FF2B5EF4-FFF2-40B4-BE49-F238E27FC236}">
+                <a16:creationId xmlns:a16="http://schemas.microsoft.com/office/drawing/2014/main" id="{F1DB0F2B-32E7-48AC-982C-A740C1B68D32}"/>
+              </a:ext>
+            </a:extLst>
+          </p:cNvPr>
+          <p:cNvSpPr>
+            <a:spLocks noGrp="1"/>
+          </p:cNvSpPr>
+          <p:nvPr>
+            <p:ph type="title"/>
+          </p:nvPr>
+        </p:nvSpPr>
+        <p:spPr/>
+        <p:txBody>
+          <a:bodyPr/>
+          <a:lstStyle/>
+          <a:p>
+            <a:r>
+              <a:rPr lang="en-US" cap="none" dirty="0">
+                <a:effectLst>
+                  <a:outerShdw blurRad="38100" dist="38100" dir="2700000" algn="tl">
+                    <a:srgbClr val="000000">
+                      <a:alpha val="43137"/>
+                    </a:srgbClr>
+                  </a:outerShdw>
+                </a:effectLst>
+              </a:rPr>
+              <a:t>Cline</a:t>
+            </a:r>
+            <a:endParaRPr lang="ru-RU" cap="none" dirty="0">
+              <a:effectLst>
+                <a:outerShdw blurRad="38100" dist="38100" dir="2700000" algn="tl">
+                  <a:srgbClr val="000000">
+                    <a:alpha val="43137"/>
+                  </a:srgbClr>
+                </a:outerShdw>
+              </a:effectLst>
+            </a:endParaRPr>
+          </a:p>
+        </p:txBody>
+      </p:sp>
+      <p:pic>
+        <p:nvPicPr>
+          <p:cNvPr id="3" name="Picture 2">
+            <a:extLst>
+              <a:ext uri="{FF2B5EF4-FFF2-40B4-BE49-F238E27FC236}">
+                <a16:creationId xmlns:a16="http://schemas.microsoft.com/office/drawing/2014/main" id="{885637A1-3DFF-418F-9BDE-09F31A860DE1}"/>
+              </a:ext>
+            </a:extLst>
+          </p:cNvPr>
+          <p:cNvPicPr>
+            <a:picLocks noChangeAspect="1"/>
+          </p:cNvPicPr>
+          <p:nvPr/>
+        </p:nvPicPr>
+        <p:blipFill>
+          <a:blip r:embed="rId2"/>
+          <a:stretch>
+            <a:fillRect/>
+          </a:stretch>
+        </p:blipFill>
+        <p:spPr>
+          <a:xfrm>
+            <a:off x="3543193" y="868215"/>
+            <a:ext cx="5105613" cy="5121569"/>
+          </a:xfrm>
+          <a:prstGeom prst="rect">
+            <a:avLst/>
+          </a:prstGeom>
+        </p:spPr>
+      </p:pic>
+    </p:spTree>
+    <p:extLst>
+      <p:ext uri="{BB962C8B-B14F-4D97-AF65-F5344CB8AC3E}">
+        <p14:creationId xmlns:p14="http://schemas.microsoft.com/office/powerpoint/2010/main" val="159564165"/>
+      </p:ext>
+    </p:extLst>
+  </p:cSld>
+  <p:clrMapOvr>
+    <a:masterClrMapping/>
+  </p:clrMapOvr>
+</p:sld>
+</file>
+
 <file path=ppt/slides/slide4.xml><?xml version="1.0" encoding="utf-8"?>
 <p:sld xmlns:a="http://schemas.openxmlformats.org/drawingml/2006/main" xmlns:r="http://schemas.openxmlformats.org/officeDocument/2006/relationships" xmlns:p="http://schemas.openxmlformats.org/presentationml/2006/main">
   <p:cSld>
@@ -14833,7 +17422,7 @@
                   </a:outerShdw>
                 </a:effectLst>
               </a:rPr>
-              <a:t>ИИ агенты</a:t>
+              <a:t>Агенты</a:t>
             </a:r>
           </a:p>
           <a:p>
@@ -14894,6 +17483,75 @@
     <p:extLst>
       <p:ext uri="{BB962C8B-B14F-4D97-AF65-F5344CB8AC3E}">
         <p14:creationId xmlns:p14="http://schemas.microsoft.com/office/powerpoint/2010/main" val="2680624056"/>
+      </p:ext>
+    </p:extLst>
+  </p:cSld>
+  <p:clrMapOvr>
+    <a:masterClrMapping/>
+  </p:clrMapOvr>
+</p:sld>
+</file>
+
+<file path=ppt/slides/slide40.xml><?xml version="1.0" encoding="utf-8"?>
+<p:sld xmlns:a="http://schemas.openxmlformats.org/drawingml/2006/main" xmlns:r="http://schemas.openxmlformats.org/officeDocument/2006/relationships" xmlns:p="http://schemas.openxmlformats.org/presentationml/2006/main">
+  <p:cSld>
+    <p:spTree>
+      <p:nvGrpSpPr>
+        <p:cNvPr id="1" name=""/>
+        <p:cNvGrpSpPr/>
+        <p:nvPr/>
+      </p:nvGrpSpPr>
+      <p:grpSpPr>
+        <a:xfrm>
+          <a:off x="0" y="0"/>
+          <a:ext cx="0" cy="0"/>
+          <a:chOff x="0" y="0"/>
+          <a:chExt cx="0" cy="0"/>
+        </a:xfrm>
+      </p:grpSpPr>
+      <p:pic>
+        <p:nvPicPr>
+          <p:cNvPr id="4" name="Picture 3">
+            <a:extLst>
+              <a:ext uri="{FF2B5EF4-FFF2-40B4-BE49-F238E27FC236}">
+                <a16:creationId xmlns:a16="http://schemas.microsoft.com/office/drawing/2014/main" id="{BDB1EF4A-3416-453F-9A04-30B336276FEA}"/>
+              </a:ext>
+            </a:extLst>
+          </p:cNvPr>
+          <p:cNvPicPr>
+            <a:picLocks noChangeAspect="1"/>
+          </p:cNvPicPr>
+          <p:nvPr/>
+        </p:nvPicPr>
+        <p:blipFill rotWithShape="1">
+          <a:blip r:embed="rId2"/>
+          <a:srcRect l="2615"/>
+          <a:stretch/>
+        </p:blipFill>
+        <p:spPr>
+          <a:xfrm>
+            <a:off x="2102563" y="1123435"/>
+            <a:ext cx="7986873" cy="4611130"/>
+          </a:xfrm>
+          <a:prstGeom prst="rect">
+            <a:avLst/>
+          </a:prstGeom>
+          <a:ln>
+            <a:noFill/>
+          </a:ln>
+          <a:effectLst>
+            <a:outerShdw blurRad="190500" algn="tl" rotWithShape="0">
+              <a:srgbClr val="000000">
+                <a:alpha val="70000"/>
+              </a:srgbClr>
+            </a:outerShdw>
+          </a:effectLst>
+        </p:spPr>
+      </p:pic>
+    </p:spTree>
+    <p:extLst>
+      <p:ext uri="{BB962C8B-B14F-4D97-AF65-F5344CB8AC3E}">
+        <p14:creationId xmlns:p14="http://schemas.microsoft.com/office/powerpoint/2010/main" val="3820262792"/>
       </p:ext>
     </p:extLst>
   </p:cSld>
@@ -15528,72 +18186,12 @@
           <a:chExt cx="0" cy="0"/>
         </a:xfrm>
       </p:grpSpPr>
-      <p:sp>
-        <p:nvSpPr>
-          <p:cNvPr id="2" name="Title 1">
+      <p:pic>
+        <p:nvPicPr>
+          <p:cNvPr id="7" name="Picture 6">
             <a:extLst>
               <a:ext uri="{FF2B5EF4-FFF2-40B4-BE49-F238E27FC236}">
-                <a16:creationId xmlns:a16="http://schemas.microsoft.com/office/drawing/2014/main" id="{E9AF73FB-1562-4FB3-8542-EDBE824EE411}"/>
-              </a:ext>
-            </a:extLst>
-          </p:cNvPr>
-          <p:cNvSpPr>
-            <a:spLocks noGrp="1"/>
-          </p:cNvSpPr>
-          <p:nvPr>
-            <p:ph type="title"/>
-          </p:nvPr>
-        </p:nvSpPr>
-        <p:spPr/>
-        <p:txBody>
-          <a:bodyPr/>
-          <a:lstStyle/>
-          <a:p>
-            <a:r>
-              <a:rPr lang="ru-RU" dirty="0"/>
-              <a:t>Объяснение кода</a:t>
-            </a:r>
-          </a:p>
-        </p:txBody>
-      </p:sp>
-      <p:pic>
-        <p:nvPicPr>
-          <p:cNvPr id="4" name="Content Placeholder 3">
-            <a:extLst>
-              <a:ext uri="{FF2B5EF4-FFF2-40B4-BE49-F238E27FC236}">
-                <a16:creationId xmlns:a16="http://schemas.microsoft.com/office/drawing/2014/main" id="{D75F99D4-B6EB-4B1A-9AE6-0948782C9F06}"/>
-              </a:ext>
-            </a:extLst>
-          </p:cNvPr>
-          <p:cNvPicPr>
-            <a:picLocks noGrp="1" noChangeAspect="1"/>
-          </p:cNvPicPr>
-          <p:nvPr>
-            <p:ph idx="1"/>
-          </p:nvPr>
-        </p:nvPicPr>
-        <p:blipFill>
-          <a:blip r:embed="rId2"/>
-          <a:stretch>
-            <a:fillRect/>
-          </a:stretch>
-        </p:blipFill>
-        <p:spPr>
-          <a:xfrm>
-            <a:off x="1055197" y="2093244"/>
-            <a:ext cx="4586287" cy="4146238"/>
-          </a:xfrm>
-          <a:prstGeom prst="rect">
-            <a:avLst/>
-          </a:prstGeom>
-        </p:spPr>
-      </p:pic>
-      <p:pic>
-        <p:nvPicPr>
-          <p:cNvPr id="5" name="Picture 4">
-            <a:extLst>
-              <a:ext uri="{FF2B5EF4-FFF2-40B4-BE49-F238E27FC236}">
-                <a16:creationId xmlns:a16="http://schemas.microsoft.com/office/drawing/2014/main" id="{6BA1301D-3FA0-4EA9-AAD2-ACA5CF49742A}"/>
+                <a16:creationId xmlns:a16="http://schemas.microsoft.com/office/drawing/2014/main" id="{72632905-EA1A-4016-A273-38EA3BF717FB}"/>
               </a:ext>
             </a:extLst>
           </p:cNvPr>
@@ -15603,15 +18201,113 @@
           <p:nvPr/>
         </p:nvPicPr>
         <p:blipFill>
-          <a:blip r:embed="rId3"/>
+          <a:blip r:embed="rId2">
+            <a:extLst>
+              <a:ext uri="{28A0092B-C50C-407E-A947-70E740481C1C}">
+                <a14:useLocalDpi xmlns:a14="http://schemas.microsoft.com/office/drawing/2010/main" val="0"/>
+              </a:ext>
+            </a:extLst>
+          </a:blip>
           <a:stretch>
             <a:fillRect/>
           </a:stretch>
         </p:blipFill>
         <p:spPr>
           <a:xfrm>
-            <a:off x="5727700" y="1003456"/>
-            <a:ext cx="5405927" cy="5236026"/>
+            <a:off x="3867468" y="325841"/>
+            <a:ext cx="2726055" cy="6057900"/>
+          </a:xfrm>
+          <a:prstGeom prst="rect">
+            <a:avLst/>
+          </a:prstGeom>
+          <a:ln>
+            <a:noFill/>
+          </a:ln>
+          <a:effectLst>
+            <a:outerShdw blurRad="292100" dist="139700" dir="2700000" algn="tl" rotWithShape="0">
+              <a:srgbClr val="333333">
+                <a:alpha val="65000"/>
+              </a:srgbClr>
+            </a:outerShdw>
+          </a:effectLst>
+        </p:spPr>
+      </p:pic>
+      <p:pic>
+        <p:nvPicPr>
+          <p:cNvPr id="9" name="Picture 8">
+            <a:extLst>
+              <a:ext uri="{FF2B5EF4-FFF2-40B4-BE49-F238E27FC236}">
+                <a16:creationId xmlns:a16="http://schemas.microsoft.com/office/drawing/2014/main" id="{78DDE9A0-038D-47BB-B25F-C99B60B65103}"/>
+              </a:ext>
+            </a:extLst>
+          </p:cNvPr>
+          <p:cNvPicPr>
+            <a:picLocks noChangeAspect="1"/>
+          </p:cNvPicPr>
+          <p:nvPr/>
+        </p:nvPicPr>
+        <p:blipFill>
+          <a:blip r:embed="rId3">
+            <a:extLst>
+              <a:ext uri="{28A0092B-C50C-407E-A947-70E740481C1C}">
+                <a14:useLocalDpi xmlns:a14="http://schemas.microsoft.com/office/drawing/2010/main" val="0"/>
+              </a:ext>
+            </a:extLst>
+          </a:blip>
+          <a:stretch>
+            <a:fillRect/>
+          </a:stretch>
+        </p:blipFill>
+        <p:spPr>
+          <a:xfrm>
+            <a:off x="7069613" y="325841"/>
+            <a:ext cx="4219620" cy="6063670"/>
+          </a:xfrm>
+          <a:prstGeom prst="rect">
+            <a:avLst/>
+          </a:prstGeom>
+          <a:ln>
+            <a:noFill/>
+          </a:ln>
+          <a:effectLst>
+            <a:outerShdw blurRad="292100" dist="139700" dir="2700000" algn="tl" rotWithShape="0">
+              <a:srgbClr val="333333">
+                <a:alpha val="65000"/>
+              </a:srgbClr>
+            </a:outerShdw>
+          </a:effectLst>
+        </p:spPr>
+      </p:pic>
+      <p:pic>
+        <p:nvPicPr>
+          <p:cNvPr id="11" name="Picture 10">
+            <a:extLst>
+              <a:ext uri="{FF2B5EF4-FFF2-40B4-BE49-F238E27FC236}">
+                <a16:creationId xmlns:a16="http://schemas.microsoft.com/office/drawing/2014/main" id="{5366F95C-450F-469D-94A0-1D48B5E21725}"/>
+              </a:ext>
+            </a:extLst>
+          </p:cNvPr>
+          <p:cNvPicPr>
+            <a:picLocks noChangeAspect="1"/>
+          </p:cNvPicPr>
+          <p:nvPr/>
+        </p:nvPicPr>
+        <p:blipFill>
+          <a:blip r:embed="rId4">
+            <a:extLst>
+              <a:ext uri="{28A0092B-C50C-407E-A947-70E740481C1C}">
+                <a14:useLocalDpi xmlns:a14="http://schemas.microsoft.com/office/drawing/2010/main" val="0"/>
+              </a:ext>
+            </a:extLst>
+          </a:blip>
+          <a:stretch>
+            <a:fillRect/>
+          </a:stretch>
+        </p:blipFill>
+        <p:spPr>
+          <a:xfrm>
+            <a:off x="665323" y="325841"/>
+            <a:ext cx="2726055" cy="6057900"/>
           </a:xfrm>
           <a:prstGeom prst="rect">
             <a:avLst/>
@@ -15621,7 +18317,7 @@
     </p:spTree>
     <p:extLst>
       <p:ext uri="{BB962C8B-B14F-4D97-AF65-F5344CB8AC3E}">
-        <p14:creationId xmlns:p14="http://schemas.microsoft.com/office/powerpoint/2010/main" val="1490703728"/>
+        <p14:creationId xmlns:p14="http://schemas.microsoft.com/office/powerpoint/2010/main" val="511989663"/>
       </p:ext>
     </p:extLst>
   </p:cSld>

</xml_diff>